<commit_message>
Update storyboard to reflect ui changes
</commit_message>
<xml_diff>
--- a/Storyboard/storyboard.pptx
+++ b/Storyboard/storyboard.pptx
@@ -288,7 +288,7 @@
           <a:p>
             <a:fld id="{B0ABA59C-0228-654F-BFE1-95CDB89751EB}" type="datetimeFigureOut">
               <a:rPr lang="en-US" smtClean="0"/>
-              <a:t>2/24/16</a:t>
+              <a:t>2/26/16</a:t>
             </a:fld>
             <a:endParaRPr lang="en-US"/>
           </a:p>
@@ -458,7 +458,7 @@
           <a:p>
             <a:fld id="{B0ABA59C-0228-654F-BFE1-95CDB89751EB}" type="datetimeFigureOut">
               <a:rPr lang="en-US" smtClean="0"/>
-              <a:t>2/24/16</a:t>
+              <a:t>2/26/16</a:t>
             </a:fld>
             <a:endParaRPr lang="en-US"/>
           </a:p>
@@ -638,7 +638,7 @@
           <a:p>
             <a:fld id="{B0ABA59C-0228-654F-BFE1-95CDB89751EB}" type="datetimeFigureOut">
               <a:rPr lang="en-US" smtClean="0"/>
-              <a:t>2/24/16</a:t>
+              <a:t>2/26/16</a:t>
             </a:fld>
             <a:endParaRPr lang="en-US"/>
           </a:p>
@@ -808,7 +808,7 @@
           <a:p>
             <a:fld id="{B0ABA59C-0228-654F-BFE1-95CDB89751EB}" type="datetimeFigureOut">
               <a:rPr lang="en-US" smtClean="0"/>
-              <a:t>2/24/16</a:t>
+              <a:t>2/26/16</a:t>
             </a:fld>
             <a:endParaRPr lang="en-US"/>
           </a:p>
@@ -1054,7 +1054,7 @@
           <a:p>
             <a:fld id="{B0ABA59C-0228-654F-BFE1-95CDB89751EB}" type="datetimeFigureOut">
               <a:rPr lang="en-US" smtClean="0"/>
-              <a:t>2/24/16</a:t>
+              <a:t>2/26/16</a:t>
             </a:fld>
             <a:endParaRPr lang="en-US"/>
           </a:p>
@@ -1342,7 +1342,7 @@
           <a:p>
             <a:fld id="{B0ABA59C-0228-654F-BFE1-95CDB89751EB}" type="datetimeFigureOut">
               <a:rPr lang="en-US" smtClean="0"/>
-              <a:t>2/24/16</a:t>
+              <a:t>2/26/16</a:t>
             </a:fld>
             <a:endParaRPr lang="en-US"/>
           </a:p>
@@ -1764,7 +1764,7 @@
           <a:p>
             <a:fld id="{B0ABA59C-0228-654F-BFE1-95CDB89751EB}" type="datetimeFigureOut">
               <a:rPr lang="en-US" smtClean="0"/>
-              <a:t>2/24/16</a:t>
+              <a:t>2/26/16</a:t>
             </a:fld>
             <a:endParaRPr lang="en-US"/>
           </a:p>
@@ -1882,7 +1882,7 @@
           <a:p>
             <a:fld id="{B0ABA59C-0228-654F-BFE1-95CDB89751EB}" type="datetimeFigureOut">
               <a:rPr lang="en-US" smtClean="0"/>
-              <a:t>2/24/16</a:t>
+              <a:t>2/26/16</a:t>
             </a:fld>
             <a:endParaRPr lang="en-US"/>
           </a:p>
@@ -1977,7 +1977,7 @@
           <a:p>
             <a:fld id="{B0ABA59C-0228-654F-BFE1-95CDB89751EB}" type="datetimeFigureOut">
               <a:rPr lang="en-US" smtClean="0"/>
-              <a:t>2/24/16</a:t>
+              <a:t>2/26/16</a:t>
             </a:fld>
             <a:endParaRPr lang="en-US"/>
           </a:p>
@@ -2254,7 +2254,7 @@
           <a:p>
             <a:fld id="{B0ABA59C-0228-654F-BFE1-95CDB89751EB}" type="datetimeFigureOut">
               <a:rPr lang="en-US" smtClean="0"/>
-              <a:t>2/24/16</a:t>
+              <a:t>2/26/16</a:t>
             </a:fld>
             <a:endParaRPr lang="en-US"/>
           </a:p>
@@ -2507,7 +2507,7 @@
           <a:p>
             <a:fld id="{B0ABA59C-0228-654F-BFE1-95CDB89751EB}" type="datetimeFigureOut">
               <a:rPr lang="en-US" smtClean="0"/>
-              <a:t>2/24/16</a:t>
+              <a:t>2/26/16</a:t>
             </a:fld>
             <a:endParaRPr lang="en-US"/>
           </a:p>
@@ -2720,7 +2720,7 @@
           <a:p>
             <a:fld id="{B0ABA59C-0228-654F-BFE1-95CDB89751EB}" type="datetimeFigureOut">
               <a:rPr lang="en-US" smtClean="0"/>
-              <a:t>2/24/16</a:t>
+              <a:t>2/26/16</a:t>
             </a:fld>
             <a:endParaRPr lang="en-US"/>
           </a:p>
@@ -3108,7 +3108,7 @@
       </p:grpSpPr>
       <p:pic>
         <p:nvPicPr>
-          <p:cNvPr id="4" name="Picture 3" descr="IMG_6679.PNG"/>
+          <p:cNvPr id="5" name="Picture 4" descr="IMG_6676.PNG"/>
           <p:cNvPicPr>
             <a:picLocks noChangeAspect="1"/>
           </p:cNvPicPr>
@@ -3122,13 +3122,13 @@
               </a:ext>
             </a:extLst>
           </a:blip>
-          <a:srcRect t="13803"/>
+          <a:srcRect t="12747"/>
           <a:stretch/>
         </p:blipFill>
         <p:spPr>
           <a:xfrm>
-            <a:off x="4961964" y="939646"/>
-            <a:ext cx="2060620" cy="3152741"/>
+            <a:off x="2705343" y="4442684"/>
+            <a:ext cx="1180830" cy="1828800"/>
           </a:xfrm>
           <a:prstGeom prst="rect">
             <a:avLst/>
@@ -3144,13 +3144,13 @@
       </p:pic>
       <p:pic>
         <p:nvPicPr>
-          <p:cNvPr id="5" name="Picture 4" descr="IMG_6676.PNG"/>
+          <p:cNvPr id="3" name="Picture 2" descr="Screen Shot 2016-02-26 at 4.02.40 PM.png"/>
           <p:cNvPicPr>
             <a:picLocks noChangeAspect="1"/>
           </p:cNvPicPr>
           <p:nvPr/>
         </p:nvPicPr>
-        <p:blipFill rotWithShape="1">
+        <p:blipFill>
           <a:blip r:embed="rId3">
             <a:extLst>
               <a:ext uri="{28A0092B-C50C-407E-A947-70E740481C1C}">
@@ -3158,13 +3158,197 @@
               </a:ext>
             </a:extLst>
           </a:blip>
-          <a:srcRect t="12747"/>
+          <a:stretch>
+            <a:fillRect/>
+          </a:stretch>
+        </p:blipFill>
+        <p:spPr>
+          <a:xfrm>
+            <a:off x="7563567" y="344187"/>
+            <a:ext cx="1091440" cy="1828800"/>
+          </a:xfrm>
+          <a:prstGeom prst="rect">
+            <a:avLst/>
+          </a:prstGeom>
+          <a:effectLst>
+            <a:outerShdw blurRad="50800" dist="38100" dir="2700000" algn="tl" rotWithShape="0">
+              <a:srgbClr val="000000">
+                <a:alpha val="43000"/>
+              </a:srgbClr>
+            </a:outerShdw>
+          </a:effectLst>
+        </p:spPr>
+      </p:pic>
+      <p:pic>
+        <p:nvPicPr>
+          <p:cNvPr id="2" name="Picture 1" descr="Screen Shot 2016-02-26 at 4.01.35 PM.png"/>
+          <p:cNvPicPr>
+            <a:picLocks noChangeAspect="1"/>
+          </p:cNvPicPr>
+          <p:nvPr/>
+        </p:nvPicPr>
+        <p:blipFill rotWithShape="1">
+          <a:blip r:embed="rId4">
+            <a:extLst>
+              <a:ext uri="{28A0092B-C50C-407E-A947-70E740481C1C}">
+                <a14:useLocalDpi xmlns:a14="http://schemas.microsoft.com/office/drawing/2010/main" val="0"/>
+              </a:ext>
+            </a:extLst>
+          </a:blip>
+          <a:srcRect b="1634"/>
           <a:stretch/>
         </p:blipFill>
         <p:spPr>
           <a:xfrm>
-            <a:off x="1860784" y="4345949"/>
-            <a:ext cx="1298913" cy="2011680"/>
+            <a:off x="1860784" y="336154"/>
+            <a:ext cx="1109573" cy="1828800"/>
+          </a:xfrm>
+          <a:prstGeom prst="rect">
+            <a:avLst/>
+          </a:prstGeom>
+          <a:effectLst>
+            <a:outerShdw blurRad="50800" dist="38100" dir="2700000" algn="tl" rotWithShape="0">
+              <a:srgbClr val="000000">
+                <a:alpha val="43000"/>
+              </a:srgbClr>
+            </a:outerShdw>
+          </a:effectLst>
+        </p:spPr>
+      </p:pic>
+      <p:pic>
+        <p:nvPicPr>
+          <p:cNvPr id="11" name="Picture 10" descr="Screen Shot 2016-02-26 at 4.08.58 PM.png"/>
+          <p:cNvPicPr>
+            <a:picLocks noChangeAspect="1"/>
+          </p:cNvPicPr>
+          <p:nvPr/>
+        </p:nvPicPr>
+        <p:blipFill>
+          <a:blip r:embed="rId5">
+            <a:extLst>
+              <a:ext uri="{28A0092B-C50C-407E-A947-70E740481C1C}">
+                <a14:useLocalDpi xmlns:a14="http://schemas.microsoft.com/office/drawing/2010/main" val="0"/>
+              </a:ext>
+            </a:extLst>
+          </a:blip>
+          <a:stretch>
+            <a:fillRect/>
+          </a:stretch>
+        </p:blipFill>
+        <p:spPr>
+          <a:xfrm>
+            <a:off x="671034" y="4468283"/>
+            <a:ext cx="1081154" cy="1828800"/>
+          </a:xfrm>
+          <a:prstGeom prst="rect">
+            <a:avLst/>
+          </a:prstGeom>
+          <a:effectLst>
+            <a:outerShdw blurRad="50800" dist="38100" dir="2700000" algn="tl" rotWithShape="0">
+              <a:srgbClr val="000000">
+                <a:alpha val="43000"/>
+              </a:srgbClr>
+            </a:outerShdw>
+          </a:effectLst>
+        </p:spPr>
+      </p:pic>
+      <p:pic>
+        <p:nvPicPr>
+          <p:cNvPr id="14" name="Picture 13" descr="Screen Shot 2016-02-26 at 4.09.45 PM.png"/>
+          <p:cNvPicPr>
+            <a:picLocks noChangeAspect="1"/>
+          </p:cNvPicPr>
+          <p:nvPr/>
+        </p:nvPicPr>
+        <p:blipFill rotWithShape="1">
+          <a:blip r:embed="rId6">
+            <a:extLst>
+              <a:ext uri="{28A0092B-C50C-407E-A947-70E740481C1C}">
+                <a14:useLocalDpi xmlns:a14="http://schemas.microsoft.com/office/drawing/2010/main" val="0"/>
+              </a:ext>
+            </a:extLst>
+          </a:blip>
+          <a:srcRect l="1" r="2274"/>
+          <a:stretch/>
+        </p:blipFill>
+        <p:spPr>
+          <a:xfrm>
+            <a:off x="3249046" y="336155"/>
+            <a:ext cx="1072313" cy="1828800"/>
+          </a:xfrm>
+          <a:prstGeom prst="rect">
+            <a:avLst/>
+          </a:prstGeom>
+          <a:effectLst>
+            <a:outerShdw blurRad="50800" dist="38100" dir="2700000" algn="tl" rotWithShape="0">
+              <a:srgbClr val="000000">
+                <a:alpha val="43000"/>
+              </a:srgbClr>
+            </a:outerShdw>
+          </a:effectLst>
+        </p:spPr>
+      </p:pic>
+      <p:pic>
+        <p:nvPicPr>
+          <p:cNvPr id="17" name="Picture 16" descr="Screen Shot 2016-02-26 at 4.13.32 PM.png"/>
+          <p:cNvPicPr>
+            <a:picLocks noChangeAspect="1"/>
+          </p:cNvPicPr>
+          <p:nvPr/>
+        </p:nvPicPr>
+        <p:blipFill>
+          <a:blip r:embed="rId7">
+            <a:extLst>
+              <a:ext uri="{28A0092B-C50C-407E-A947-70E740481C1C}">
+                <a14:useLocalDpi xmlns:a14="http://schemas.microsoft.com/office/drawing/2010/main" val="0"/>
+              </a:ext>
+            </a:extLst>
+          </a:blip>
+          <a:stretch>
+            <a:fillRect/>
+          </a:stretch>
+        </p:blipFill>
+        <p:spPr>
+          <a:xfrm>
+            <a:off x="641691" y="2331887"/>
+            <a:ext cx="1091440" cy="1828800"/>
+          </a:xfrm>
+          <a:prstGeom prst="rect">
+            <a:avLst/>
+          </a:prstGeom>
+          <a:effectLst>
+            <a:outerShdw blurRad="50800" dist="38100" dir="2700000" algn="tl" rotWithShape="0">
+              <a:srgbClr val="000000">
+                <a:alpha val="43000"/>
+              </a:srgbClr>
+            </a:outerShdw>
+          </a:effectLst>
+        </p:spPr>
+      </p:pic>
+      <p:pic>
+        <p:nvPicPr>
+          <p:cNvPr id="18" name="Picture 17" descr="Screen Shot 2016-02-26 at 4.13.42 PM.png"/>
+          <p:cNvPicPr>
+            <a:picLocks noChangeAspect="1"/>
+          </p:cNvPicPr>
+          <p:nvPr/>
+        </p:nvPicPr>
+        <p:blipFill>
+          <a:blip r:embed="rId8">
+            <a:extLst>
+              <a:ext uri="{28A0092B-C50C-407E-A947-70E740481C1C}">
+                <a14:useLocalDpi xmlns:a14="http://schemas.microsoft.com/office/drawing/2010/main" val="0"/>
+              </a:ext>
+            </a:extLst>
+          </a:blip>
+          <a:stretch>
+            <a:fillRect/>
+          </a:stretch>
+        </p:blipFill>
+        <p:spPr>
+          <a:xfrm>
+            <a:off x="641691" y="336155"/>
+            <a:ext cx="1085622" cy="1828800"/>
           </a:xfrm>
           <a:prstGeom prst="rect">
             <a:avLst/>
@@ -3187,7 +3371,7 @@
           <p:nvPr/>
         </p:nvPicPr>
         <p:blipFill rotWithShape="1">
-          <a:blip r:embed="rId4">
+          <a:blip r:embed="rId9">
             <a:extLst>
               <a:ext uri="{28A0092B-C50C-407E-A947-70E740481C1C}">
                 <a14:useLocalDpi xmlns:a14="http://schemas.microsoft.com/office/drawing/2010/main" val="0"/>
@@ -3199,219 +3383,8 @@
         </p:blipFill>
         <p:spPr>
           <a:xfrm>
-            <a:off x="4035823" y="4345949"/>
-            <a:ext cx="1298913" cy="2011680"/>
-          </a:xfrm>
-          <a:prstGeom prst="rect">
-            <a:avLst/>
-          </a:prstGeom>
-          <a:effectLst>
-            <a:outerShdw blurRad="50800" dist="38100" dir="2700000" algn="tl" rotWithShape="0">
-              <a:srgbClr val="000000">
-                <a:alpha val="43000"/>
-              </a:srgbClr>
-            </a:outerShdw>
-          </a:effectLst>
-        </p:spPr>
-      </p:pic>
-      <p:pic>
-        <p:nvPicPr>
-          <p:cNvPr id="8" name="Picture 7" descr="IMG_6680.PNG"/>
-          <p:cNvPicPr>
-            <a:picLocks noChangeAspect="1"/>
-          </p:cNvPicPr>
-          <p:nvPr/>
-        </p:nvPicPr>
-        <p:blipFill rotWithShape="1">
-          <a:blip r:embed="rId5">
-            <a:extLst>
-              <a:ext uri="{28A0092B-C50C-407E-A947-70E740481C1C}">
-                <a14:useLocalDpi xmlns:a14="http://schemas.microsoft.com/office/drawing/2010/main" val="0"/>
-              </a:ext>
-            </a:extLst>
-          </a:blip>
-          <a:srcRect t="3789"/>
-          <a:stretch/>
-        </p:blipFill>
-        <p:spPr>
-          <a:xfrm>
-            <a:off x="7648905" y="434787"/>
-            <a:ext cx="1030310" cy="1759493"/>
-          </a:xfrm>
-          <a:prstGeom prst="rect">
-            <a:avLst/>
-          </a:prstGeom>
-          <a:effectLst>
-            <a:outerShdw blurRad="50800" dist="38100" dir="2700000" algn="tl" rotWithShape="0">
-              <a:srgbClr val="000000">
-                <a:alpha val="43000"/>
-              </a:srgbClr>
-            </a:outerShdw>
-          </a:effectLst>
-        </p:spPr>
-      </p:pic>
-      <p:pic>
-        <p:nvPicPr>
-          <p:cNvPr id="9" name="Picture 8" descr="IMG_6681.PNG"/>
-          <p:cNvPicPr>
-            <a:picLocks noChangeAspect="1"/>
-          </p:cNvPicPr>
-          <p:nvPr/>
-        </p:nvPicPr>
-        <p:blipFill rotWithShape="1">
-          <a:blip r:embed="rId6">
-            <a:extLst>
-              <a:ext uri="{28A0092B-C50C-407E-A947-70E740481C1C}">
-                <a14:useLocalDpi xmlns:a14="http://schemas.microsoft.com/office/drawing/2010/main" val="0"/>
-              </a:ext>
-            </a:extLst>
-          </a:blip>
-          <a:srcRect t="11683"/>
-          <a:stretch/>
-        </p:blipFill>
-        <p:spPr>
-          <a:xfrm>
-            <a:off x="3186057" y="434787"/>
-            <a:ext cx="1030310" cy="1615141"/>
-          </a:xfrm>
-          <a:prstGeom prst="rect">
-            <a:avLst/>
-          </a:prstGeom>
-          <a:effectLst>
-            <a:outerShdw blurRad="50800" dist="38100" dir="2700000" algn="tl" rotWithShape="0">
-              <a:srgbClr val="000000">
-                <a:alpha val="43000"/>
-              </a:srgbClr>
-            </a:outerShdw>
-          </a:effectLst>
-        </p:spPr>
-      </p:pic>
-      <p:pic>
-        <p:nvPicPr>
-          <p:cNvPr id="12" name="Picture 11" descr="IMG_6682.PNG"/>
-          <p:cNvPicPr>
-            <a:picLocks noChangeAspect="1"/>
-          </p:cNvPicPr>
-          <p:nvPr/>
-        </p:nvPicPr>
-        <p:blipFill rotWithShape="1">
-          <a:blip r:embed="rId7">
-            <a:extLst>
-              <a:ext uri="{28A0092B-C50C-407E-A947-70E740481C1C}">
-                <a14:useLocalDpi xmlns:a14="http://schemas.microsoft.com/office/drawing/2010/main" val="0"/>
-              </a:ext>
-            </a:extLst>
-          </a:blip>
-          <a:srcRect t="14689"/>
-          <a:stretch/>
-        </p:blipFill>
-        <p:spPr>
-          <a:xfrm>
-            <a:off x="1860784" y="489755"/>
-            <a:ext cx="1030310" cy="1560174"/>
-          </a:xfrm>
-          <a:prstGeom prst="rect">
-            <a:avLst/>
-          </a:prstGeom>
-          <a:effectLst>
-            <a:outerShdw blurRad="50800" dist="38100" dir="2700000" algn="tl" rotWithShape="0">
-              <a:srgbClr val="000000">
-                <a:alpha val="43000"/>
-              </a:srgbClr>
-            </a:outerShdw>
-          </a:effectLst>
-        </p:spPr>
-      </p:pic>
-      <p:pic>
-        <p:nvPicPr>
-          <p:cNvPr id="13" name="Picture 12" descr="IMG_6684.PNG"/>
-          <p:cNvPicPr>
-            <a:picLocks noChangeAspect="1"/>
-          </p:cNvPicPr>
-          <p:nvPr/>
-        </p:nvPicPr>
-        <p:blipFill rotWithShape="1">
-          <a:blip r:embed="rId8">
-            <a:extLst>
-              <a:ext uri="{28A0092B-C50C-407E-A947-70E740481C1C}">
-                <a14:useLocalDpi xmlns:a14="http://schemas.microsoft.com/office/drawing/2010/main" val="0"/>
-              </a:ext>
-            </a:extLst>
-          </a:blip>
-          <a:srcRect t="14689"/>
-          <a:stretch/>
-        </p:blipFill>
-        <p:spPr>
-          <a:xfrm>
-            <a:off x="619047" y="489755"/>
-            <a:ext cx="1030310" cy="1560173"/>
-          </a:xfrm>
-          <a:prstGeom prst="rect">
-            <a:avLst/>
-          </a:prstGeom>
-          <a:effectLst>
-            <a:outerShdw blurRad="50800" dist="38100" dir="2700000" algn="tl" rotWithShape="0">
-              <a:srgbClr val="000000">
-                <a:alpha val="43000"/>
-              </a:srgbClr>
-            </a:outerShdw>
-          </a:effectLst>
-        </p:spPr>
-      </p:pic>
-      <p:pic>
-        <p:nvPicPr>
-          <p:cNvPr id="15" name="Picture 14"/>
-          <p:cNvPicPr>
-            <a:picLocks noChangeAspect="1"/>
-          </p:cNvPicPr>
-          <p:nvPr/>
-        </p:nvPicPr>
-        <p:blipFill>
-          <a:blip r:embed="rId9"/>
-          <a:stretch>
-            <a:fillRect/>
-          </a:stretch>
-        </p:blipFill>
-        <p:spPr>
-          <a:xfrm>
-            <a:off x="6279764" y="4345949"/>
-            <a:ext cx="1307362" cy="2011680"/>
-          </a:xfrm>
-          <a:prstGeom prst="rect">
-            <a:avLst/>
-          </a:prstGeom>
-          <a:effectLst>
-            <a:outerShdw blurRad="50800" dist="38100" dir="2700000" algn="tl" rotWithShape="0">
-              <a:srgbClr val="000000">
-                <a:alpha val="43000"/>
-              </a:srgbClr>
-            </a:outerShdw>
-          </a:effectLst>
-        </p:spPr>
-      </p:pic>
-      <p:pic>
-        <p:nvPicPr>
-          <p:cNvPr id="16" name="Picture 15" descr="IMG_6683.PNG"/>
-          <p:cNvPicPr>
-            <a:picLocks noChangeAspect="1"/>
-          </p:cNvPicPr>
-          <p:nvPr/>
-        </p:nvPicPr>
-        <p:blipFill rotWithShape="1">
-          <a:blip r:embed="rId10">
-            <a:extLst>
-              <a:ext uri="{28A0092B-C50C-407E-A947-70E740481C1C}">
-                <a14:useLocalDpi xmlns:a14="http://schemas.microsoft.com/office/drawing/2010/main" val="0"/>
-              </a:ext>
-            </a:extLst>
-          </a:blip>
-          <a:srcRect t="14486"/>
-          <a:stretch/>
-        </p:blipFill>
-        <p:spPr>
-          <a:xfrm>
-            <a:off x="619047" y="2528504"/>
-            <a:ext cx="1030310" cy="1563883"/>
+            <a:off x="4638881" y="4442684"/>
+            <a:ext cx="1180830" cy="1828800"/>
           </a:xfrm>
           <a:prstGeom prst="rect">
             <a:avLst/>
@@ -3428,14 +3401,12 @@
       <p:cxnSp>
         <p:nvCxnSpPr>
           <p:cNvPr id="22" name="Straight Arrow Connector 21"/>
-          <p:cNvCxnSpPr>
-            <a:endCxn id="12" idx="1"/>
-          </p:cNvCxnSpPr>
+          <p:cNvCxnSpPr/>
           <p:nvPr/>
         </p:nvCxnSpPr>
         <p:spPr>
           <a:xfrm flipV="1">
-            <a:off x="841590" y="1269842"/>
+            <a:off x="841590" y="1060249"/>
             <a:ext cx="1019194" cy="5235"/>
           </a:xfrm>
           <a:prstGeom prst="straightConnector1">
@@ -3443,193 +3414,7 @@
           </a:prstGeom>
           <a:ln>
             <a:solidFill>
-              <a:srgbClr val="FF0000"/>
-            </a:solidFill>
-            <a:tailEnd type="arrow"/>
-          </a:ln>
-        </p:spPr>
-        <p:style>
-          <a:lnRef idx="2">
-            <a:schemeClr val="accent2"/>
-          </a:lnRef>
-          <a:fillRef idx="0">
-            <a:schemeClr val="accent2"/>
-          </a:fillRef>
-          <a:effectRef idx="1">
-            <a:schemeClr val="accent2"/>
-          </a:effectRef>
-          <a:fontRef idx="minor">
-            <a:schemeClr val="tx1"/>
-          </a:fontRef>
-        </p:style>
-      </p:cxnSp>
-      <p:cxnSp>
-        <p:nvCxnSpPr>
-          <p:cNvPr id="29" name="Straight Arrow Connector 28"/>
-          <p:cNvCxnSpPr>
-            <a:endCxn id="16" idx="0"/>
-          </p:cNvCxnSpPr>
-          <p:nvPr/>
-        </p:nvCxnSpPr>
-        <p:spPr>
-          <a:xfrm>
-            <a:off x="1134202" y="1433186"/>
-            <a:ext cx="0" cy="1095318"/>
-          </a:xfrm>
-          <a:prstGeom prst="straightConnector1">
-            <a:avLst/>
-          </a:prstGeom>
-          <a:ln>
-            <a:solidFill>
-              <a:srgbClr val="FF0000"/>
-            </a:solidFill>
-            <a:tailEnd type="arrow"/>
-          </a:ln>
-        </p:spPr>
-        <p:style>
-          <a:lnRef idx="2">
-            <a:schemeClr val="accent2"/>
-          </a:lnRef>
-          <a:fillRef idx="0">
-            <a:schemeClr val="accent2"/>
-          </a:fillRef>
-          <a:effectRef idx="1">
-            <a:schemeClr val="accent2"/>
-          </a:effectRef>
-          <a:fontRef idx="minor">
-            <a:schemeClr val="tx1"/>
-          </a:fontRef>
-        </p:style>
-      </p:cxnSp>
-      <p:cxnSp>
-        <p:nvCxnSpPr>
-          <p:cNvPr id="32" name="Straight Arrow Connector 31"/>
-          <p:cNvCxnSpPr/>
-          <p:nvPr/>
-        </p:nvCxnSpPr>
-        <p:spPr>
-          <a:xfrm flipV="1">
-            <a:off x="1280237" y="2049929"/>
-            <a:ext cx="0" cy="1418280"/>
-          </a:xfrm>
-          <a:prstGeom prst="straightConnector1">
-            <a:avLst/>
-          </a:prstGeom>
-          <a:ln>
-            <a:solidFill>
-              <a:srgbClr val="FF0000"/>
-            </a:solidFill>
-            <a:tailEnd type="arrow"/>
-          </a:ln>
-        </p:spPr>
-        <p:style>
-          <a:lnRef idx="2">
-            <a:schemeClr val="accent2"/>
-          </a:lnRef>
-          <a:fillRef idx="0">
-            <a:schemeClr val="accent2"/>
-          </a:fillRef>
-          <a:effectRef idx="1">
-            <a:schemeClr val="accent2"/>
-          </a:effectRef>
-          <a:fontRef idx="minor">
-            <a:schemeClr val="tx1"/>
-          </a:fontRef>
-        </p:style>
-      </p:cxnSp>
-      <p:cxnSp>
-        <p:nvCxnSpPr>
-          <p:cNvPr id="39" name="Straight Arrow Connector 38"/>
-          <p:cNvCxnSpPr/>
-          <p:nvPr/>
-        </p:nvCxnSpPr>
-        <p:spPr>
-          <a:xfrm flipH="1">
-            <a:off x="2891094" y="561034"/>
-            <a:ext cx="357952" cy="0"/>
-          </a:xfrm>
-          <a:prstGeom prst="straightConnector1">
-            <a:avLst/>
-          </a:prstGeom>
-          <a:ln>
-            <a:solidFill>
-              <a:srgbClr val="FF0000"/>
-            </a:solidFill>
-            <a:tailEnd type="arrow"/>
-          </a:ln>
-        </p:spPr>
-        <p:style>
-          <a:lnRef idx="2">
-            <a:schemeClr val="accent2"/>
-          </a:lnRef>
-          <a:fillRef idx="0">
-            <a:schemeClr val="accent2"/>
-          </a:fillRef>
-          <a:effectRef idx="1">
-            <a:schemeClr val="accent2"/>
-          </a:effectRef>
-          <a:fontRef idx="minor">
-            <a:schemeClr val="tx1"/>
-          </a:fontRef>
-        </p:style>
-      </p:cxnSp>
-      <p:cxnSp>
-        <p:nvCxnSpPr>
-          <p:cNvPr id="41" name="Curved Connector 40"/>
-          <p:cNvCxnSpPr/>
-          <p:nvPr/>
-        </p:nvCxnSpPr>
-        <p:spPr>
-          <a:xfrm>
-            <a:off x="3504074" y="489755"/>
-            <a:ext cx="1457890" cy="1045437"/>
-          </a:xfrm>
-          <a:prstGeom prst="curvedConnector3">
-            <a:avLst>
-              <a:gd name="adj1" fmla="val 35891"/>
-            </a:avLst>
-          </a:prstGeom>
-          <a:ln>
-            <a:solidFill>
-              <a:srgbClr val="FF0000"/>
-            </a:solidFill>
-            <a:tailEnd type="arrow"/>
-          </a:ln>
-        </p:spPr>
-        <p:style>
-          <a:lnRef idx="2">
-            <a:schemeClr val="accent2"/>
-          </a:lnRef>
-          <a:fillRef idx="0">
-            <a:schemeClr val="accent2"/>
-          </a:fillRef>
-          <a:effectRef idx="1">
-            <a:schemeClr val="accent2"/>
-          </a:effectRef>
-          <a:fontRef idx="minor">
-            <a:schemeClr val="tx1"/>
-          </a:fontRef>
-        </p:style>
-      </p:cxnSp>
-      <p:cxnSp>
-        <p:nvCxnSpPr>
-          <p:cNvPr id="44" name="Curved Connector 43"/>
-          <p:cNvCxnSpPr/>
-          <p:nvPr/>
-        </p:nvCxnSpPr>
-        <p:spPr>
-          <a:xfrm rot="10800000" flipV="1">
-            <a:off x="1649357" y="1433186"/>
-            <a:ext cx="1752706" cy="1218974"/>
-          </a:xfrm>
-          <a:prstGeom prst="curvedConnector3">
-            <a:avLst>
-              <a:gd name="adj1" fmla="val 21481"/>
-            </a:avLst>
-          </a:prstGeom>
-          <a:ln>
-            <a:solidFill>
-              <a:srgbClr val="FF0000"/>
+              <a:srgbClr val="FFFF00"/>
             </a:solidFill>
             <a:tailEnd type="arrow"/>
           </a:ln>
@@ -3651,72 +3436,57 @@
       </p:cxnSp>
       <p:grpSp>
         <p:nvGrpSpPr>
-          <p:cNvPr id="108" name="Group 107"/>
+          <p:cNvPr id="196" name="Group 195"/>
           <p:cNvGrpSpPr/>
           <p:nvPr/>
         </p:nvGrpSpPr>
         <p:grpSpPr>
           <a:xfrm>
-            <a:off x="907897" y="1708603"/>
-            <a:ext cx="4054067" cy="1606596"/>
-            <a:chOff x="907897" y="1708603"/>
-            <a:chExt cx="4054067" cy="1606596"/>
+            <a:off x="5819711" y="5190720"/>
+            <a:ext cx="945028" cy="228600"/>
+            <a:chOff x="5819711" y="5190720"/>
+            <a:chExt cx="945028" cy="228600"/>
           </a:xfrm>
         </p:grpSpPr>
+        <p:pic>
+          <p:nvPicPr>
+            <p:cNvPr id="98" name="Picture 97"/>
+            <p:cNvPicPr>
+              <a:picLocks noChangeAspect="1"/>
+            </p:cNvPicPr>
+            <p:nvPr/>
+          </p:nvPicPr>
+          <p:blipFill>
+            <a:blip r:embed="rId10"/>
+            <a:stretch>
+              <a:fillRect/>
+            </a:stretch>
+          </p:blipFill>
+          <p:spPr>
+            <a:xfrm>
+              <a:off x="6212675" y="5190720"/>
+              <a:ext cx="228600" cy="228600"/>
+            </a:xfrm>
+            <a:prstGeom prst="rect">
+              <a:avLst/>
+            </a:prstGeom>
+          </p:spPr>
+        </p:pic>
         <p:cxnSp>
           <p:nvCxnSpPr>
-            <p:cNvPr id="34" name="Curved Connector 33"/>
-            <p:cNvCxnSpPr/>
-            <p:nvPr/>
-          </p:nvCxnSpPr>
-          <p:spPr>
-            <a:xfrm flipV="1">
-              <a:off x="907897" y="2516017"/>
-              <a:ext cx="4002237" cy="799182"/>
-            </a:xfrm>
-            <a:prstGeom prst="curvedConnector3">
-              <a:avLst>
-                <a:gd name="adj1" fmla="val 50000"/>
-              </a:avLst>
-            </a:prstGeom>
-            <a:ln>
-              <a:solidFill>
-                <a:srgbClr val="FF0000"/>
-              </a:solidFill>
-            </a:ln>
-          </p:spPr>
-          <p:style>
-            <a:lnRef idx="2">
-              <a:schemeClr val="accent2"/>
-            </a:lnRef>
-            <a:fillRef idx="0">
-              <a:schemeClr val="accent2"/>
-            </a:fillRef>
-            <a:effectRef idx="1">
-              <a:schemeClr val="accent2"/>
-            </a:effectRef>
-            <a:fontRef idx="minor">
-              <a:schemeClr val="tx1"/>
-            </a:fontRef>
-          </p:style>
-        </p:cxnSp>
-        <p:cxnSp>
-          <p:nvCxnSpPr>
-            <p:cNvPr id="24" name="Curved Connector 23"/>
+            <p:cNvPr id="100" name="Straight Arrow Connector 99"/>
             <p:cNvCxnSpPr>
-              <a:endCxn id="4" idx="1"/>
+              <a:endCxn id="98" idx="1"/>
             </p:cNvCxnSpPr>
             <p:nvPr/>
           </p:nvCxnSpPr>
           <p:spPr>
             <a:xfrm>
-              <a:off x="2121826" y="1708603"/>
-              <a:ext cx="2840138" cy="807414"/>
+              <a:off x="5819711" y="5299824"/>
+              <a:ext cx="392964" cy="5196"/>
             </a:xfrm>
-            <a:prstGeom prst="curvedConnector3">
-              <a:avLst>
-                <a:gd name="adj1" fmla="val 35274"/>
-              </a:avLst>
+            <a:prstGeom prst="straightConnector1">
+              <a:avLst/>
             </a:prstGeom>
             <a:ln>
               <a:solidFill>
@@ -3740,244 +3510,18 @@
             </a:fontRef>
           </p:style>
         </p:cxnSp>
-      </p:grpSp>
-      <p:cxnSp>
-        <p:nvCxnSpPr>
-          <p:cNvPr id="50" name="Straight Arrow Connector 49"/>
-          <p:cNvCxnSpPr/>
-          <p:nvPr/>
-        </p:nvCxnSpPr>
-        <p:spPr>
-          <a:xfrm flipH="1">
-            <a:off x="4216367" y="1069980"/>
-            <a:ext cx="893773" cy="0"/>
-          </a:xfrm>
-          <a:prstGeom prst="straightConnector1">
-            <a:avLst/>
-          </a:prstGeom>
-          <a:ln>
-            <a:solidFill>
-              <a:srgbClr val="FF0000"/>
-            </a:solidFill>
-            <a:tailEnd type="arrow"/>
-          </a:ln>
-        </p:spPr>
-        <p:style>
-          <a:lnRef idx="2">
-            <a:schemeClr val="accent2"/>
-          </a:lnRef>
-          <a:fillRef idx="0">
-            <a:schemeClr val="accent2"/>
-          </a:fillRef>
-          <a:effectRef idx="1">
-            <a:schemeClr val="accent2"/>
-          </a:effectRef>
-          <a:fontRef idx="minor">
-            <a:schemeClr val="tx1"/>
-          </a:fontRef>
-        </p:style>
-      </p:cxnSp>
-      <p:cxnSp>
-        <p:nvCxnSpPr>
-          <p:cNvPr id="52" name="Straight Arrow Connector 51"/>
-          <p:cNvCxnSpPr/>
-          <p:nvPr/>
-        </p:nvCxnSpPr>
-        <p:spPr>
-          <a:xfrm>
-            <a:off x="6806033" y="1104980"/>
-            <a:ext cx="842872" cy="0"/>
-          </a:xfrm>
-          <a:prstGeom prst="straightConnector1">
-            <a:avLst/>
-          </a:prstGeom>
-          <a:ln>
-            <a:solidFill>
-              <a:srgbClr val="FF0000"/>
-            </a:solidFill>
-            <a:tailEnd type="arrow"/>
-          </a:ln>
-        </p:spPr>
-        <p:style>
-          <a:lnRef idx="2">
-            <a:schemeClr val="accent2"/>
-          </a:lnRef>
-          <a:fillRef idx="0">
-            <a:schemeClr val="accent2"/>
-          </a:fillRef>
-          <a:effectRef idx="1">
-            <a:schemeClr val="accent2"/>
-          </a:effectRef>
-          <a:fontRef idx="minor">
-            <a:schemeClr val="tx1"/>
-          </a:fontRef>
-        </p:style>
-      </p:cxnSp>
-      <p:cxnSp>
-        <p:nvCxnSpPr>
-          <p:cNvPr id="54" name="Straight Arrow Connector 53"/>
-          <p:cNvCxnSpPr/>
-          <p:nvPr/>
-        </p:nvCxnSpPr>
-        <p:spPr>
-          <a:xfrm flipH="1">
-            <a:off x="7022584" y="2174280"/>
-            <a:ext cx="662626" cy="0"/>
-          </a:xfrm>
-          <a:prstGeom prst="straightConnector1">
-            <a:avLst/>
-          </a:prstGeom>
-          <a:ln>
-            <a:solidFill>
-              <a:srgbClr val="FF0000"/>
-            </a:solidFill>
-            <a:tailEnd type="arrow"/>
-          </a:ln>
-        </p:spPr>
-        <p:style>
-          <a:lnRef idx="2">
-            <a:schemeClr val="accent2"/>
-          </a:lnRef>
-          <a:fillRef idx="0">
-            <a:schemeClr val="accent2"/>
-          </a:fillRef>
-          <a:effectRef idx="1">
-            <a:schemeClr val="accent2"/>
-          </a:effectRef>
-          <a:fontRef idx="minor">
-            <a:schemeClr val="tx1"/>
-          </a:fontRef>
-        </p:style>
-      </p:cxnSp>
-      <p:grpSp>
-        <p:nvGrpSpPr>
-          <p:cNvPr id="107" name="Group 106"/>
-          <p:cNvGrpSpPr/>
-          <p:nvPr/>
-        </p:nvGrpSpPr>
-        <p:grpSpPr>
-          <a:xfrm>
-            <a:off x="4035823" y="239996"/>
-            <a:ext cx="4814419" cy="1934284"/>
-            <a:chOff x="4035823" y="239996"/>
-            <a:chExt cx="4814419" cy="1934284"/>
-          </a:xfrm>
-        </p:grpSpPr>
         <p:cxnSp>
           <p:nvCxnSpPr>
-            <p:cNvPr id="65" name="Straight Connector 64"/>
-            <p:cNvCxnSpPr/>
+            <p:cNvPr id="102" name="Straight Arrow Connector 101"/>
+            <p:cNvCxnSpPr>
+              <a:stCxn id="98" idx="3"/>
+            </p:cNvCxnSpPr>
             <p:nvPr/>
           </p:nvCxnSpPr>
           <p:spPr>
             <a:xfrm>
-              <a:off x="8620236" y="2174280"/>
-              <a:ext cx="230006" cy="0"/>
-            </a:xfrm>
-            <a:prstGeom prst="line">
-              <a:avLst/>
-            </a:prstGeom>
-            <a:ln>
-              <a:solidFill>
-                <a:srgbClr val="FF0000"/>
-              </a:solidFill>
-            </a:ln>
-          </p:spPr>
-          <p:style>
-            <a:lnRef idx="2">
-              <a:schemeClr val="accent2"/>
-            </a:lnRef>
-            <a:fillRef idx="0">
-              <a:schemeClr val="accent2"/>
-            </a:fillRef>
-            <a:effectRef idx="1">
-              <a:schemeClr val="accent2"/>
-            </a:effectRef>
-            <a:fontRef idx="minor">
-              <a:schemeClr val="tx1"/>
-            </a:fontRef>
-          </p:style>
-        </p:cxnSp>
-        <p:cxnSp>
-          <p:nvCxnSpPr>
-            <p:cNvPr id="67" name="Straight Connector 66"/>
-            <p:cNvCxnSpPr/>
-            <p:nvPr/>
-          </p:nvCxnSpPr>
-          <p:spPr>
-            <a:xfrm flipV="1">
-              <a:off x="8850242" y="239996"/>
-              <a:ext cx="0" cy="1934284"/>
-            </a:xfrm>
-            <a:prstGeom prst="line">
-              <a:avLst/>
-            </a:prstGeom>
-            <a:ln>
-              <a:solidFill>
-                <a:srgbClr val="FF0000"/>
-              </a:solidFill>
-            </a:ln>
-          </p:spPr>
-          <p:style>
-            <a:lnRef idx="2">
-              <a:schemeClr val="accent2"/>
-            </a:lnRef>
-            <a:fillRef idx="0">
-              <a:schemeClr val="accent2"/>
-            </a:fillRef>
-            <a:effectRef idx="1">
-              <a:schemeClr val="accent2"/>
-            </a:effectRef>
-            <a:fontRef idx="minor">
-              <a:schemeClr val="tx1"/>
-            </a:fontRef>
-          </p:style>
-        </p:cxnSp>
-        <p:cxnSp>
-          <p:nvCxnSpPr>
-            <p:cNvPr id="71" name="Straight Connector 70"/>
-            <p:cNvCxnSpPr/>
-            <p:nvPr/>
-          </p:nvCxnSpPr>
-          <p:spPr>
-            <a:xfrm flipH="1">
-              <a:off x="4035823" y="239996"/>
-              <a:ext cx="4814419" cy="0"/>
-            </a:xfrm>
-            <a:prstGeom prst="line">
-              <a:avLst/>
-            </a:prstGeom>
-            <a:ln>
-              <a:solidFill>
-                <a:srgbClr val="FF0000"/>
-              </a:solidFill>
-            </a:ln>
-          </p:spPr>
-          <p:style>
-            <a:lnRef idx="2">
-              <a:schemeClr val="accent2"/>
-            </a:lnRef>
-            <a:fillRef idx="0">
-              <a:schemeClr val="accent2"/>
-            </a:fillRef>
-            <a:effectRef idx="1">
-              <a:schemeClr val="accent2"/>
-            </a:effectRef>
-            <a:fontRef idx="minor">
-              <a:schemeClr val="tx1"/>
-            </a:fontRef>
-          </p:style>
-        </p:cxnSp>
-        <p:cxnSp>
-          <p:nvCxnSpPr>
-            <p:cNvPr id="73" name="Straight Arrow Connector 72"/>
-            <p:cNvCxnSpPr/>
-            <p:nvPr/>
-          </p:nvCxnSpPr>
-          <p:spPr>
-            <a:xfrm>
-              <a:off x="4035823" y="239996"/>
-              <a:ext cx="0" cy="194791"/>
+              <a:off x="6441275" y="5305020"/>
+              <a:ext cx="323464" cy="0"/>
             </a:xfrm>
             <a:prstGeom prst="straightConnector1">
               <a:avLst/>
@@ -4005,86 +3549,170 @@
           </p:style>
         </p:cxnSp>
       </p:grpSp>
+      <p:sp>
+        <p:nvSpPr>
+          <p:cNvPr id="111" name="Striped Right Arrow 110"/>
+          <p:cNvSpPr/>
+          <p:nvPr/>
+        </p:nvSpPr>
+        <p:spPr>
+          <a:xfrm>
+            <a:off x="110967" y="1027526"/>
+            <a:ext cx="508079" cy="484632"/>
+          </a:xfrm>
+          <a:prstGeom prst="stripedRightArrow">
+            <a:avLst>
+              <a:gd name="adj1" fmla="val 38944"/>
+              <a:gd name="adj2" fmla="val 42368"/>
+            </a:avLst>
+          </a:prstGeom>
+          <a:noFill/>
+          <a:ln w="19050" cmpd="sng">
+            <a:solidFill>
+              <a:srgbClr val="FF6600"/>
+            </a:solidFill>
+          </a:ln>
+        </p:spPr>
+        <p:style>
+          <a:lnRef idx="1">
+            <a:schemeClr val="accent1"/>
+          </a:lnRef>
+          <a:fillRef idx="3">
+            <a:schemeClr val="accent1"/>
+          </a:fillRef>
+          <a:effectRef idx="2">
+            <a:schemeClr val="accent1"/>
+          </a:effectRef>
+          <a:fontRef idx="minor">
+            <a:schemeClr val="lt1"/>
+          </a:fontRef>
+        </p:style>
+        <p:txBody>
+          <a:bodyPr rtlCol="0" anchor="ctr"/>
+          <a:lstStyle/>
+          <a:p>
+            <a:pPr algn="ctr"/>
+            <a:endParaRPr lang="en-US"/>
+          </a:p>
+        </p:txBody>
+      </p:sp>
+      <p:sp>
+        <p:nvSpPr>
+          <p:cNvPr id="112" name="Striped Right Arrow 111"/>
+          <p:cNvSpPr/>
+          <p:nvPr/>
+        </p:nvSpPr>
+        <p:spPr>
+          <a:xfrm>
+            <a:off x="113530" y="2850961"/>
+            <a:ext cx="508079" cy="484632"/>
+          </a:xfrm>
+          <a:prstGeom prst="stripedRightArrow">
+            <a:avLst>
+              <a:gd name="adj1" fmla="val 38944"/>
+              <a:gd name="adj2" fmla="val 42368"/>
+            </a:avLst>
+          </a:prstGeom>
+          <a:noFill/>
+          <a:ln w="19050" cmpd="sng">
+            <a:solidFill>
+              <a:srgbClr val="FF6600"/>
+            </a:solidFill>
+          </a:ln>
+        </p:spPr>
+        <p:style>
+          <a:lnRef idx="1">
+            <a:schemeClr val="accent1"/>
+          </a:lnRef>
+          <a:fillRef idx="3">
+            <a:schemeClr val="accent1"/>
+          </a:fillRef>
+          <a:effectRef idx="2">
+            <a:schemeClr val="accent1"/>
+          </a:effectRef>
+          <a:fontRef idx="minor">
+            <a:schemeClr val="lt1"/>
+          </a:fontRef>
+        </p:style>
+        <p:txBody>
+          <a:bodyPr rtlCol="0" anchor="ctr"/>
+          <a:lstStyle/>
+          <a:p>
+            <a:pPr algn="ctr"/>
+            <a:endParaRPr lang="en-US"/>
+          </a:p>
+        </p:txBody>
+      </p:sp>
+      <p:pic>
+        <p:nvPicPr>
+          <p:cNvPr id="6" name="Picture 5" descr="Screen Shot 2016-02-26 at 4.03.05 PM.png"/>
+          <p:cNvPicPr>
+            <a:picLocks noChangeAspect="1"/>
+          </p:cNvPicPr>
+          <p:nvPr/>
+        </p:nvPicPr>
+        <p:blipFill>
+          <a:blip r:embed="rId11">
+            <a:extLst>
+              <a:ext uri="{28A0092B-C50C-407E-A947-70E740481C1C}">
+                <a14:useLocalDpi xmlns:a14="http://schemas.microsoft.com/office/drawing/2010/main" val="0"/>
+              </a:ext>
+            </a:extLst>
+          </a:blip>
+          <a:stretch>
+            <a:fillRect/>
+          </a:stretch>
+        </p:blipFill>
+        <p:spPr>
+          <a:xfrm>
+            <a:off x="4638881" y="344187"/>
+            <a:ext cx="2282266" cy="3816500"/>
+          </a:xfrm>
+          <a:prstGeom prst="rect">
+            <a:avLst/>
+          </a:prstGeom>
+          <a:effectLst>
+            <a:outerShdw blurRad="50800" dist="38100" dir="2700000" algn="tl" rotWithShape="0">
+              <a:srgbClr val="000000">
+                <a:alpha val="43000"/>
+              </a:srgbClr>
+            </a:outerShdw>
+          </a:effectLst>
+        </p:spPr>
+      </p:pic>
       <p:grpSp>
         <p:nvGrpSpPr>
-          <p:cNvPr id="106" name="Group 105"/>
+          <p:cNvPr id="38" name="Group 37"/>
           <p:cNvGrpSpPr/>
           <p:nvPr/>
         </p:nvGrpSpPr>
         <p:grpSpPr>
           <a:xfrm>
-            <a:off x="2280361" y="6297083"/>
-            <a:ext cx="312556" cy="329574"/>
-            <a:chOff x="2280361" y="6297083"/>
-            <a:chExt cx="312556" cy="329574"/>
+            <a:off x="2013184" y="1739184"/>
+            <a:ext cx="1235862" cy="135276"/>
+            <a:chOff x="2013184" y="1739184"/>
+            <a:chExt cx="1235862" cy="135276"/>
           </a:xfrm>
         </p:grpSpPr>
-        <p:sp>
-          <p:nvSpPr>
-            <p:cNvPr id="88" name="Freeform 87"/>
-            <p:cNvSpPr/>
+        <p:cxnSp>
+          <p:nvCxnSpPr>
+            <p:cNvPr id="60" name="Straight Arrow Connector 59"/>
+            <p:cNvCxnSpPr/>
             <p:nvPr/>
-          </p:nvSpPr>
+          </p:nvCxnSpPr>
           <p:spPr>
-            <a:xfrm>
-              <a:off x="2280361" y="6297083"/>
-              <a:ext cx="312556" cy="329574"/>
+            <a:xfrm flipV="1">
+              <a:off x="2013184" y="1739184"/>
+              <a:ext cx="1235862" cy="1"/>
             </a:xfrm>
-            <a:custGeom>
+            <a:prstGeom prst="straightConnector1">
               <a:avLst/>
-              <a:gdLst>
-                <a:gd name="connsiteX0" fmla="*/ 148514 w 312556"/>
-                <a:gd name="connsiteY0" fmla="*/ 0 h 329574"/>
-                <a:gd name="connsiteX1" fmla="*/ 347 w 312556"/>
-                <a:gd name="connsiteY1" fmla="*/ 179917 h 329574"/>
-                <a:gd name="connsiteX2" fmla="*/ 185556 w 312556"/>
-                <a:gd name="connsiteY2" fmla="*/ 328084 h 329574"/>
-                <a:gd name="connsiteX3" fmla="*/ 312556 w 312556"/>
-                <a:gd name="connsiteY3" fmla="*/ 243417 h 329574"/>
-              </a:gdLst>
-              <a:ahLst/>
-              <a:cxnLst>
-                <a:cxn ang="0">
-                  <a:pos x="connsiteX0" y="connsiteY0"/>
-                </a:cxn>
-                <a:cxn ang="0">
-                  <a:pos x="connsiteX1" y="connsiteY1"/>
-                </a:cxn>
-                <a:cxn ang="0">
-                  <a:pos x="connsiteX2" y="connsiteY2"/>
-                </a:cxn>
-                <a:cxn ang="0">
-                  <a:pos x="connsiteX3" y="connsiteY3"/>
-                </a:cxn>
-              </a:cxnLst>
-              <a:rect l="l" t="t" r="r" b="b"/>
-              <a:pathLst>
-                <a:path w="312556" h="329574">
-                  <a:moveTo>
-                    <a:pt x="148514" y="0"/>
-                  </a:moveTo>
-                  <a:cubicBezTo>
-                    <a:pt x="71343" y="62618"/>
-                    <a:pt x="-5827" y="125236"/>
-                    <a:pt x="347" y="179917"/>
-                  </a:cubicBezTo>
-                  <a:cubicBezTo>
-                    <a:pt x="6521" y="234598"/>
-                    <a:pt x="133521" y="317501"/>
-                    <a:pt x="185556" y="328084"/>
-                  </a:cubicBezTo>
-                  <a:cubicBezTo>
-                    <a:pt x="237591" y="338667"/>
-                    <a:pt x="275073" y="291042"/>
-                    <a:pt x="312556" y="243417"/>
-                  </a:cubicBezTo>
-                </a:path>
-              </a:pathLst>
-            </a:custGeom>
+            </a:prstGeom>
             <a:ln>
               <a:solidFill>
-                <a:srgbClr val="FF0000"/>
+                <a:srgbClr val="008000"/>
               </a:solidFill>
+              <a:tailEnd type="arrow"/>
             </a:ln>
           </p:spPr>
           <p:style>
@@ -4101,27 +3729,494 @@
               <a:schemeClr val="tx1"/>
             </a:fontRef>
           </p:style>
-          <p:txBody>
-            <a:bodyPr rtlCol="0" anchor="ctr"/>
-            <a:lstStyle/>
-            <a:p>
-              <a:pPr algn="ctr"/>
-              <a:endParaRPr lang="en-US"/>
-            </a:p>
-          </p:txBody>
-        </p:sp>
+        </p:cxnSp>
         <p:cxnSp>
           <p:nvCxnSpPr>
-            <p:cNvPr id="90" name="Straight Arrow Connector 89"/>
+            <p:cNvPr id="36" name="Straight Connector 35"/>
+            <p:cNvCxnSpPr/>
+            <p:nvPr/>
+          </p:nvCxnSpPr>
+          <p:spPr>
+            <a:xfrm flipV="1">
+              <a:off x="2013184" y="1739185"/>
+              <a:ext cx="0" cy="135275"/>
+            </a:xfrm>
+            <a:prstGeom prst="line">
+              <a:avLst/>
+            </a:prstGeom>
+            <a:ln>
+              <a:solidFill>
+                <a:srgbClr val="008000"/>
+              </a:solidFill>
+            </a:ln>
+          </p:spPr>
+          <p:style>
+            <a:lnRef idx="2">
+              <a:schemeClr val="accent1"/>
+            </a:lnRef>
+            <a:fillRef idx="0">
+              <a:schemeClr val="accent1"/>
+            </a:fillRef>
+            <a:effectRef idx="1">
+              <a:schemeClr val="accent1"/>
+            </a:effectRef>
+            <a:fontRef idx="minor">
+              <a:schemeClr val="tx1"/>
+            </a:fontRef>
+          </p:style>
+        </p:cxnSp>
+        <p:cxnSp>
+          <p:nvCxnSpPr>
+            <p:cNvPr id="68" name="Straight Connector 67"/>
+            <p:cNvCxnSpPr/>
+            <p:nvPr/>
+          </p:nvCxnSpPr>
+          <p:spPr>
+            <a:xfrm flipV="1">
+              <a:off x="2381879" y="1739184"/>
+              <a:ext cx="0" cy="135275"/>
+            </a:xfrm>
+            <a:prstGeom prst="line">
+              <a:avLst/>
+            </a:prstGeom>
+            <a:ln>
+              <a:solidFill>
+                <a:srgbClr val="008000"/>
+              </a:solidFill>
+            </a:ln>
+          </p:spPr>
+          <p:style>
+            <a:lnRef idx="2">
+              <a:schemeClr val="accent1"/>
+            </a:lnRef>
+            <a:fillRef idx="0">
+              <a:schemeClr val="accent1"/>
+            </a:fillRef>
+            <a:effectRef idx="1">
+              <a:schemeClr val="accent1"/>
+            </a:effectRef>
+            <a:fontRef idx="minor">
+              <a:schemeClr val="tx1"/>
+            </a:fontRef>
+          </p:style>
+        </p:cxnSp>
+      </p:grpSp>
+      <p:grpSp>
+        <p:nvGrpSpPr>
+          <p:cNvPr id="46" name="Group 45"/>
+          <p:cNvGrpSpPr/>
+          <p:nvPr/>
+        </p:nvGrpSpPr>
+        <p:grpSpPr>
+          <a:xfrm>
+            <a:off x="1733132" y="1142422"/>
+            <a:ext cx="2376469" cy="1353649"/>
+            <a:chOff x="1733132" y="1142422"/>
+            <a:chExt cx="2376469" cy="1353649"/>
+          </a:xfrm>
+        </p:grpSpPr>
+        <p:cxnSp>
+          <p:nvCxnSpPr>
+            <p:cNvPr id="63" name="Straight Arrow Connector 62"/>
+            <p:cNvCxnSpPr/>
+            <p:nvPr/>
+          </p:nvCxnSpPr>
+          <p:spPr>
+            <a:xfrm flipH="1">
+              <a:off x="1733132" y="2496070"/>
+              <a:ext cx="1001056" cy="1"/>
+            </a:xfrm>
+            <a:prstGeom prst="straightConnector1">
+              <a:avLst/>
+            </a:prstGeom>
+            <a:ln>
+              <a:solidFill>
+                <a:srgbClr val="FF6600"/>
+              </a:solidFill>
+              <a:tailEnd type="arrow"/>
+            </a:ln>
+          </p:spPr>
+          <p:style>
+            <a:lnRef idx="2">
+              <a:schemeClr val="accent2"/>
+            </a:lnRef>
+            <a:fillRef idx="0">
+              <a:schemeClr val="accent2"/>
+            </a:fillRef>
+            <a:effectRef idx="1">
+              <a:schemeClr val="accent2"/>
+            </a:effectRef>
+            <a:fontRef idx="minor">
+              <a:schemeClr val="tx1"/>
+            </a:fontRef>
+          </p:style>
+        </p:cxnSp>
+        <p:cxnSp>
+          <p:nvCxnSpPr>
+            <p:cNvPr id="69" name="Straight Connector 68"/>
+            <p:cNvCxnSpPr/>
+            <p:nvPr/>
+          </p:nvCxnSpPr>
+          <p:spPr>
+            <a:xfrm flipV="1">
+              <a:off x="2725732" y="1891586"/>
+              <a:ext cx="0" cy="604485"/>
+            </a:xfrm>
+            <a:prstGeom prst="line">
+              <a:avLst/>
+            </a:prstGeom>
+            <a:ln>
+              <a:solidFill>
+                <a:srgbClr val="FF6600"/>
+              </a:solidFill>
+            </a:ln>
+          </p:spPr>
+          <p:style>
+            <a:lnRef idx="2">
+              <a:schemeClr val="accent1"/>
+            </a:lnRef>
+            <a:fillRef idx="0">
+              <a:schemeClr val="accent1"/>
+            </a:fillRef>
+            <a:effectRef idx="1">
+              <a:schemeClr val="accent1"/>
+            </a:effectRef>
+            <a:fontRef idx="minor">
+              <a:schemeClr val="tx1"/>
+            </a:fontRef>
+          </p:style>
+        </p:cxnSp>
+        <p:cxnSp>
+          <p:nvCxnSpPr>
+            <p:cNvPr id="42" name="Straight Connector 41"/>
+            <p:cNvCxnSpPr/>
+            <p:nvPr/>
+          </p:nvCxnSpPr>
+          <p:spPr>
+            <a:xfrm>
+              <a:off x="4109601" y="1142422"/>
+              <a:ext cx="0" cy="1353648"/>
+            </a:xfrm>
+            <a:prstGeom prst="line">
+              <a:avLst/>
+            </a:prstGeom>
+            <a:ln>
+              <a:solidFill>
+                <a:srgbClr val="FF6600"/>
+              </a:solidFill>
+            </a:ln>
+          </p:spPr>
+          <p:style>
+            <a:lnRef idx="2">
+              <a:schemeClr val="accent1"/>
+            </a:lnRef>
+            <a:fillRef idx="0">
+              <a:schemeClr val="accent1"/>
+            </a:fillRef>
+            <a:effectRef idx="1">
+              <a:schemeClr val="accent1"/>
+            </a:effectRef>
+            <a:fontRef idx="minor">
+              <a:schemeClr val="tx1"/>
+            </a:fontRef>
+          </p:style>
+        </p:cxnSp>
+        <p:cxnSp>
+          <p:nvCxnSpPr>
+            <p:cNvPr id="45" name="Straight Connector 44"/>
+            <p:cNvCxnSpPr/>
+            <p:nvPr/>
+          </p:nvCxnSpPr>
+          <p:spPr>
+            <a:xfrm flipH="1">
+              <a:off x="2734188" y="2496071"/>
+              <a:ext cx="1375413" cy="0"/>
+            </a:xfrm>
+            <a:prstGeom prst="line">
+              <a:avLst/>
+            </a:prstGeom>
+            <a:ln>
+              <a:solidFill>
+                <a:srgbClr val="FF6600"/>
+              </a:solidFill>
+            </a:ln>
+          </p:spPr>
+          <p:style>
+            <a:lnRef idx="2">
+              <a:schemeClr val="accent1"/>
+            </a:lnRef>
+            <a:fillRef idx="0">
+              <a:schemeClr val="accent1"/>
+            </a:fillRef>
+            <a:effectRef idx="1">
+              <a:schemeClr val="accent1"/>
+            </a:effectRef>
+            <a:fontRef idx="minor">
+              <a:schemeClr val="tx1"/>
+            </a:fontRef>
+          </p:style>
+        </p:cxnSp>
+      </p:grpSp>
+      <p:grpSp>
+        <p:nvGrpSpPr>
+          <p:cNvPr id="191" name="Group 190"/>
+          <p:cNvGrpSpPr/>
+          <p:nvPr/>
+        </p:nvGrpSpPr>
+        <p:grpSpPr>
+          <a:xfrm>
+            <a:off x="841590" y="1142422"/>
+            <a:ext cx="3797291" cy="1918826"/>
+            <a:chOff x="841590" y="1142422"/>
+            <a:chExt cx="3797291" cy="1918826"/>
+          </a:xfrm>
+        </p:grpSpPr>
+        <p:cxnSp>
+          <p:nvCxnSpPr>
+            <p:cNvPr id="25" name="Straight Arrow Connector 24"/>
+            <p:cNvCxnSpPr/>
+            <p:nvPr/>
+          </p:nvCxnSpPr>
+          <p:spPr>
+            <a:xfrm>
+              <a:off x="841590" y="3061248"/>
+              <a:ext cx="3797291" cy="0"/>
+            </a:xfrm>
+            <a:prstGeom prst="straightConnector1">
+              <a:avLst/>
+            </a:prstGeom>
+            <a:ln>
+              <a:solidFill>
+                <a:srgbClr val="000090"/>
+              </a:solidFill>
+              <a:tailEnd type="arrow"/>
+            </a:ln>
+          </p:spPr>
+          <p:style>
+            <a:lnRef idx="2">
+              <a:schemeClr val="accent1"/>
+            </a:lnRef>
+            <a:fillRef idx="0">
+              <a:schemeClr val="accent1"/>
+            </a:fillRef>
+            <a:effectRef idx="1">
+              <a:schemeClr val="accent1"/>
+            </a:effectRef>
+            <a:fontRef idx="minor">
+              <a:schemeClr val="tx1"/>
+            </a:fontRef>
+          </p:style>
+        </p:cxnSp>
+        <p:cxnSp>
+          <p:nvCxnSpPr>
+            <p:cNvPr id="51" name="Straight Connector 50"/>
+            <p:cNvCxnSpPr/>
+            <p:nvPr/>
+          </p:nvCxnSpPr>
+          <p:spPr>
+            <a:xfrm>
+              <a:off x="3416348" y="1142422"/>
+              <a:ext cx="0" cy="1918826"/>
+            </a:xfrm>
+            <a:prstGeom prst="line">
+              <a:avLst/>
+            </a:prstGeom>
+            <a:ln>
+              <a:solidFill>
+                <a:srgbClr val="000090"/>
+              </a:solidFill>
+            </a:ln>
+          </p:spPr>
+          <p:style>
+            <a:lnRef idx="2">
+              <a:schemeClr val="accent1"/>
+            </a:lnRef>
+            <a:fillRef idx="0">
+              <a:schemeClr val="accent1"/>
+            </a:fillRef>
+            <a:effectRef idx="1">
+              <a:schemeClr val="accent1"/>
+            </a:effectRef>
+            <a:fontRef idx="minor">
+              <a:schemeClr val="tx1"/>
+            </a:fontRef>
+          </p:style>
+        </p:cxnSp>
+      </p:grpSp>
+      <p:grpSp>
+        <p:nvGrpSpPr>
+          <p:cNvPr id="57" name="Group 56"/>
+          <p:cNvGrpSpPr/>
+          <p:nvPr/>
+        </p:nvGrpSpPr>
+        <p:grpSpPr>
+          <a:xfrm>
+            <a:off x="2970357" y="1142422"/>
+            <a:ext cx="770317" cy="369736"/>
+            <a:chOff x="2970357" y="1142422"/>
+            <a:chExt cx="770317" cy="369736"/>
+          </a:xfrm>
+        </p:grpSpPr>
+        <p:cxnSp>
+          <p:nvCxnSpPr>
+            <p:cNvPr id="81" name="Straight Connector 80"/>
+            <p:cNvCxnSpPr/>
+            <p:nvPr/>
+          </p:nvCxnSpPr>
+          <p:spPr>
+            <a:xfrm>
+              <a:off x="3740674" y="1142422"/>
+              <a:ext cx="0" cy="369736"/>
+            </a:xfrm>
+            <a:prstGeom prst="line">
+              <a:avLst/>
+            </a:prstGeom>
+            <a:ln>
+              <a:solidFill>
+                <a:srgbClr val="FFFF00"/>
+              </a:solidFill>
+            </a:ln>
+          </p:spPr>
+          <p:style>
+            <a:lnRef idx="2">
+              <a:schemeClr val="accent1"/>
+            </a:lnRef>
+            <a:fillRef idx="0">
+              <a:schemeClr val="accent1"/>
+            </a:fillRef>
+            <a:effectRef idx="1">
+              <a:schemeClr val="accent1"/>
+            </a:effectRef>
+            <a:fontRef idx="minor">
+              <a:schemeClr val="tx1"/>
+            </a:fontRef>
+          </p:style>
+        </p:cxnSp>
+        <p:cxnSp>
+          <p:nvCxnSpPr>
+            <p:cNvPr id="56" name="Straight Arrow Connector 55"/>
+            <p:cNvCxnSpPr/>
+            <p:nvPr/>
+          </p:nvCxnSpPr>
+          <p:spPr>
+            <a:xfrm flipH="1">
+              <a:off x="2970357" y="1512158"/>
+              <a:ext cx="770317" cy="0"/>
+            </a:xfrm>
+            <a:prstGeom prst="straightConnector1">
+              <a:avLst/>
+            </a:prstGeom>
+            <a:ln>
+              <a:solidFill>
+                <a:srgbClr val="FFFF00"/>
+              </a:solidFill>
+              <a:tailEnd type="arrow"/>
+            </a:ln>
+          </p:spPr>
+          <p:style>
+            <a:lnRef idx="2">
+              <a:schemeClr val="accent1"/>
+            </a:lnRef>
+            <a:fillRef idx="0">
+              <a:schemeClr val="accent1"/>
+            </a:fillRef>
+            <a:effectRef idx="1">
+              <a:schemeClr val="accent1"/>
+            </a:effectRef>
+            <a:fontRef idx="minor">
+              <a:schemeClr val="tx1"/>
+            </a:fontRef>
+          </p:style>
+        </p:cxnSp>
+      </p:grpSp>
+      <p:grpSp>
+        <p:nvGrpSpPr>
+          <p:cNvPr id="195" name="Group 194"/>
+          <p:cNvGrpSpPr/>
+          <p:nvPr/>
+        </p:nvGrpSpPr>
+        <p:grpSpPr>
+          <a:xfrm>
+            <a:off x="1764695" y="5190720"/>
+            <a:ext cx="945028" cy="228600"/>
+            <a:chOff x="1764695" y="5190720"/>
+            <a:chExt cx="945028" cy="228600"/>
+          </a:xfrm>
+        </p:grpSpPr>
+        <p:pic>
+          <p:nvPicPr>
+            <p:cNvPr id="103" name="Picture 102"/>
+            <p:cNvPicPr>
+              <a:picLocks noChangeAspect="1"/>
+            </p:cNvPicPr>
+            <p:nvPr/>
+          </p:nvPicPr>
+          <p:blipFill>
+            <a:blip r:embed="rId10"/>
+            <a:stretch>
+              <a:fillRect/>
+            </a:stretch>
+          </p:blipFill>
+          <p:spPr>
+            <a:xfrm>
+              <a:off x="2157659" y="5190720"/>
+              <a:ext cx="228600" cy="228600"/>
+            </a:xfrm>
+            <a:prstGeom prst="rect">
+              <a:avLst/>
+            </a:prstGeom>
+          </p:spPr>
+        </p:pic>
+        <p:cxnSp>
+          <p:nvCxnSpPr>
+            <p:cNvPr id="109" name="Straight Arrow Connector 108"/>
             <p:cNvCxnSpPr>
-              <a:stCxn id="88" idx="3"/>
+              <a:endCxn id="103" idx="1"/>
             </p:cNvCxnSpPr>
             <p:nvPr/>
           </p:nvCxnSpPr>
           <p:spPr>
-            <a:xfrm flipV="1">
-              <a:off x="2592917" y="6357629"/>
-              <a:ext cx="0" cy="182871"/>
+            <a:xfrm>
+              <a:off x="1764695" y="5299824"/>
+              <a:ext cx="392964" cy="5196"/>
+            </a:xfrm>
+            <a:prstGeom prst="straightConnector1">
+              <a:avLst/>
+            </a:prstGeom>
+            <a:ln>
+              <a:solidFill>
+                <a:srgbClr val="FF0000"/>
+              </a:solidFill>
+              <a:tailEnd type="arrow"/>
+            </a:ln>
+          </p:spPr>
+          <p:style>
+            <a:lnRef idx="2">
+              <a:schemeClr val="accent2"/>
+            </a:lnRef>
+            <a:fillRef idx="0">
+              <a:schemeClr val="accent2"/>
+            </a:fillRef>
+            <a:effectRef idx="1">
+              <a:schemeClr val="accent2"/>
+            </a:effectRef>
+            <a:fontRef idx="minor">
+              <a:schemeClr val="tx1"/>
+            </a:fontRef>
+          </p:style>
+        </p:cxnSp>
+        <p:cxnSp>
+          <p:nvCxnSpPr>
+            <p:cNvPr id="113" name="Straight Arrow Connector 112"/>
+            <p:cNvCxnSpPr>
+              <a:stCxn id="103" idx="3"/>
+            </p:cNvCxnSpPr>
+            <p:nvPr/>
+          </p:nvCxnSpPr>
+          <p:spPr>
+            <a:xfrm>
+              <a:off x="2386259" y="5305020"/>
+              <a:ext cx="323464" cy="0"/>
             </a:xfrm>
             <a:prstGeom prst="straightConnector1">
               <a:avLst/>
@@ -4149,168 +4244,98 @@
           </p:style>
         </p:cxnSp>
       </p:grpSp>
-      <p:cxnSp>
-        <p:nvCxnSpPr>
-          <p:cNvPr id="93" name="Curved Connector 92"/>
-          <p:cNvCxnSpPr/>
-          <p:nvPr/>
-        </p:nvCxnSpPr>
-        <p:spPr>
-          <a:xfrm flipV="1">
-            <a:off x="3116792" y="5471583"/>
-            <a:ext cx="919031" cy="825502"/>
-          </a:xfrm>
-          <a:prstGeom prst="curvedConnector3">
-            <a:avLst>
-              <a:gd name="adj1" fmla="val 50000"/>
-            </a:avLst>
-          </a:prstGeom>
-          <a:ln>
-            <a:solidFill>
-              <a:srgbClr val="FF0000"/>
-            </a:solidFill>
-            <a:tailEnd type="arrow"/>
-          </a:ln>
-        </p:spPr>
-        <p:style>
-          <a:lnRef idx="2">
-            <a:schemeClr val="accent2"/>
-          </a:lnRef>
-          <a:fillRef idx="0">
-            <a:schemeClr val="accent2"/>
-          </a:fillRef>
-          <a:effectRef idx="1">
-            <a:schemeClr val="accent2"/>
-          </a:effectRef>
-          <a:fontRef idx="minor">
-            <a:schemeClr val="tx1"/>
-          </a:fontRef>
-        </p:style>
-      </p:cxnSp>
       <p:pic>
         <p:nvPicPr>
-          <p:cNvPr id="98" name="Picture 97"/>
+          <p:cNvPr id="87" name="Picture 86" descr="Screen Shot 2016-02-26 at 4.40.37 PM.png"/>
           <p:cNvPicPr>
             <a:picLocks noChangeAspect="1"/>
           </p:cNvPicPr>
           <p:nvPr/>
         </p:nvPicPr>
         <p:blipFill>
-          <a:blip r:embed="rId11"/>
+          <a:blip r:embed="rId12">
+            <a:extLst>
+              <a:ext uri="{28A0092B-C50C-407E-A947-70E740481C1C}">
+                <a14:useLocalDpi xmlns:a14="http://schemas.microsoft.com/office/drawing/2010/main" val="0"/>
+              </a:ext>
+            </a:extLst>
+          </a:blip>
           <a:stretch>
             <a:fillRect/>
           </a:stretch>
         </p:blipFill>
         <p:spPr>
           <a:xfrm>
-            <a:off x="5727700" y="5093985"/>
-            <a:ext cx="228600" cy="228600"/>
+            <a:off x="6764739" y="4442684"/>
+            <a:ext cx="1095814" cy="1828800"/>
           </a:xfrm>
           <a:prstGeom prst="rect">
             <a:avLst/>
           </a:prstGeom>
         </p:spPr>
       </p:pic>
-      <p:cxnSp>
-        <p:nvCxnSpPr>
-          <p:cNvPr id="100" name="Straight Arrow Connector 99"/>
-          <p:cNvCxnSpPr>
-            <a:endCxn id="98" idx="1"/>
-          </p:cNvCxnSpPr>
-          <p:nvPr/>
-        </p:nvCxnSpPr>
-        <p:spPr>
-          <a:xfrm>
-            <a:off x="5334736" y="5203089"/>
-            <a:ext cx="392964" cy="5196"/>
-          </a:xfrm>
-          <a:prstGeom prst="straightConnector1">
-            <a:avLst/>
-          </a:prstGeom>
-          <a:ln>
-            <a:solidFill>
-              <a:srgbClr val="FF0000"/>
-            </a:solidFill>
-            <a:tailEnd type="arrow"/>
-          </a:ln>
-        </p:spPr>
-        <p:style>
-          <a:lnRef idx="2">
-            <a:schemeClr val="accent2"/>
-          </a:lnRef>
-          <a:fillRef idx="0">
-            <a:schemeClr val="accent2"/>
-          </a:fillRef>
-          <a:effectRef idx="1">
-            <a:schemeClr val="accent2"/>
-          </a:effectRef>
-          <a:fontRef idx="minor">
-            <a:schemeClr val="tx1"/>
-          </a:fontRef>
-        </p:style>
-      </p:cxnSp>
-      <p:cxnSp>
-        <p:nvCxnSpPr>
-          <p:cNvPr id="102" name="Straight Arrow Connector 101"/>
-          <p:cNvCxnSpPr>
-            <a:stCxn id="98" idx="3"/>
-          </p:cNvCxnSpPr>
-          <p:nvPr/>
-        </p:nvCxnSpPr>
-        <p:spPr>
-          <a:xfrm>
-            <a:off x="5956300" y="5208285"/>
-            <a:ext cx="323464" cy="0"/>
-          </a:xfrm>
-          <a:prstGeom prst="straightConnector1">
-            <a:avLst/>
-          </a:prstGeom>
-          <a:ln>
-            <a:solidFill>
-              <a:srgbClr val="FF0000"/>
-            </a:solidFill>
-            <a:tailEnd type="arrow"/>
-          </a:ln>
-        </p:spPr>
-        <p:style>
-          <a:lnRef idx="2">
-            <a:schemeClr val="accent2"/>
-          </a:lnRef>
-          <a:fillRef idx="0">
-            <a:schemeClr val="accent2"/>
-          </a:fillRef>
-          <a:effectRef idx="1">
-            <a:schemeClr val="accent2"/>
-          </a:effectRef>
-          <a:fontRef idx="minor">
-            <a:schemeClr val="tx1"/>
-          </a:fontRef>
-        </p:style>
-      </p:cxnSp>
       <p:grpSp>
         <p:nvGrpSpPr>
-          <p:cNvPr id="105" name="Group 104"/>
+          <p:cNvPr id="198" name="Group 197"/>
           <p:cNvGrpSpPr/>
           <p:nvPr/>
         </p:nvGrpSpPr>
         <p:grpSpPr>
           <a:xfrm>
-            <a:off x="1915583" y="3767667"/>
-            <a:ext cx="6371167" cy="2963333"/>
-            <a:chOff x="1915583" y="3767667"/>
-            <a:chExt cx="6371167" cy="2963333"/>
+            <a:off x="3805465" y="5357085"/>
+            <a:ext cx="833416" cy="862557"/>
+            <a:chOff x="3805465" y="5357085"/>
+            <a:chExt cx="833416" cy="862557"/>
           </a:xfrm>
         </p:grpSpPr>
         <p:cxnSp>
           <p:nvCxnSpPr>
-            <p:cNvPr id="75" name="Straight Connector 74"/>
+            <p:cNvPr id="95" name="Elbow Connector 94"/>
+            <p:cNvCxnSpPr>
+              <a:endCxn id="7" idx="1"/>
+            </p:cNvCxnSpPr>
+            <p:nvPr/>
+          </p:nvCxnSpPr>
+          <p:spPr>
+            <a:xfrm rot="5400000" flipH="1" flipV="1">
+              <a:off x="4026941" y="5607702"/>
+              <a:ext cx="862557" cy="361323"/>
+            </a:xfrm>
+            <a:prstGeom prst="bentConnector2">
+              <a:avLst/>
+            </a:prstGeom>
+            <a:ln>
+              <a:solidFill>
+                <a:srgbClr val="FF0000"/>
+              </a:solidFill>
+              <a:tailEnd type="arrow"/>
+            </a:ln>
+          </p:spPr>
+          <p:style>
+            <a:lnRef idx="2">
+              <a:schemeClr val="accent1"/>
+            </a:lnRef>
+            <a:fillRef idx="0">
+              <a:schemeClr val="accent1"/>
+            </a:fillRef>
+            <a:effectRef idx="1">
+              <a:schemeClr val="accent1"/>
+            </a:effectRef>
+            <a:fontRef idx="minor">
+              <a:schemeClr val="tx1"/>
+            </a:fontRef>
+          </p:style>
+        </p:cxnSp>
+        <p:cxnSp>
+          <p:nvCxnSpPr>
+            <p:cNvPr id="114" name="Straight Connector 113"/>
             <p:cNvCxnSpPr/>
             <p:nvPr/>
           </p:nvCxnSpPr>
           <p:spPr>
-            <a:xfrm>
-              <a:off x="1915583" y="6731000"/>
-              <a:ext cx="6371167" cy="0"/>
+            <a:xfrm flipH="1">
+              <a:off x="3805465" y="6219640"/>
+              <a:ext cx="472093" cy="0"/>
             </a:xfrm>
             <a:prstGeom prst="line">
               <a:avLst/>
@@ -4323,29 +4348,44 @@
           </p:spPr>
           <p:style>
             <a:lnRef idx="2">
-              <a:schemeClr val="accent2"/>
+              <a:schemeClr val="accent1"/>
             </a:lnRef>
             <a:fillRef idx="0">
-              <a:schemeClr val="accent2"/>
+              <a:schemeClr val="accent1"/>
             </a:fillRef>
             <a:effectRef idx="1">
-              <a:schemeClr val="accent2"/>
+              <a:schemeClr val="accent1"/>
             </a:effectRef>
             <a:fontRef idx="minor">
               <a:schemeClr val="tx1"/>
             </a:fontRef>
           </p:style>
         </p:cxnSp>
+      </p:grpSp>
+      <p:grpSp>
+        <p:nvGrpSpPr>
+          <p:cNvPr id="197" name="Group 196"/>
+          <p:cNvGrpSpPr/>
+          <p:nvPr/>
+        </p:nvGrpSpPr>
+        <p:grpSpPr>
+          <a:xfrm>
+            <a:off x="3268227" y="6226825"/>
+            <a:ext cx="148121" cy="286470"/>
+            <a:chOff x="3268227" y="6226825"/>
+            <a:chExt cx="148121" cy="286470"/>
+          </a:xfrm>
+        </p:grpSpPr>
         <p:cxnSp>
           <p:nvCxnSpPr>
-            <p:cNvPr id="77" name="Straight Connector 76"/>
+            <p:cNvPr id="120" name="Straight Connector 119"/>
             <p:cNvCxnSpPr/>
             <p:nvPr/>
           </p:nvCxnSpPr>
           <p:spPr>
             <a:xfrm>
-              <a:off x="1915583" y="6357629"/>
-              <a:ext cx="0" cy="373371"/>
+              <a:off x="3268227" y="6226825"/>
+              <a:ext cx="0" cy="286470"/>
             </a:xfrm>
             <a:prstGeom prst="line">
               <a:avLst/>
@@ -4358,13 +4398,13 @@
           </p:spPr>
           <p:style>
             <a:lnRef idx="2">
-              <a:schemeClr val="accent2"/>
+              <a:schemeClr val="accent1"/>
             </a:lnRef>
             <a:fillRef idx="0">
-              <a:schemeClr val="accent2"/>
+              <a:schemeClr val="accent1"/>
             </a:fillRef>
             <a:effectRef idx="1">
-              <a:schemeClr val="accent2"/>
+              <a:schemeClr val="accent1"/>
             </a:effectRef>
             <a:fontRef idx="minor">
               <a:schemeClr val="tx1"/>
@@ -4373,14 +4413,14 @@
         </p:cxnSp>
         <p:cxnSp>
           <p:nvCxnSpPr>
-            <p:cNvPr id="79" name="Straight Connector 78"/>
+            <p:cNvPr id="123" name="Straight Connector 122"/>
             <p:cNvCxnSpPr/>
             <p:nvPr/>
           </p:nvCxnSpPr>
           <p:spPr>
-            <a:xfrm flipV="1">
-              <a:off x="5281083" y="6297084"/>
-              <a:ext cx="1" cy="433916"/>
+            <a:xfrm>
+              <a:off x="3268227" y="6513295"/>
+              <a:ext cx="148121" cy="0"/>
             </a:xfrm>
             <a:prstGeom prst="line">
               <a:avLst/>
@@ -4393,13 +4433,13 @@
           </p:spPr>
           <p:style>
             <a:lnRef idx="2">
-              <a:schemeClr val="accent2"/>
+              <a:schemeClr val="accent1"/>
             </a:lnRef>
             <a:fillRef idx="0">
-              <a:schemeClr val="accent2"/>
+              <a:schemeClr val="accent1"/>
             </a:fillRef>
             <a:effectRef idx="1">
-              <a:schemeClr val="accent2"/>
+              <a:schemeClr val="accent1"/>
             </a:effectRef>
             <a:fontRef idx="minor">
               <a:schemeClr val="tx1"/>
@@ -4408,84 +4448,14 @@
         </p:cxnSp>
         <p:cxnSp>
           <p:nvCxnSpPr>
-            <p:cNvPr id="84" name="Straight Connector 83"/>
+            <p:cNvPr id="125" name="Straight Arrow Connector 124"/>
             <p:cNvCxnSpPr/>
             <p:nvPr/>
           </p:nvCxnSpPr>
           <p:spPr>
             <a:xfrm flipV="1">
-              <a:off x="7534275" y="6297084"/>
-              <a:ext cx="1" cy="433916"/>
-            </a:xfrm>
-            <a:prstGeom prst="line">
-              <a:avLst/>
-            </a:prstGeom>
-            <a:ln>
-              <a:solidFill>
-                <a:srgbClr val="FF0000"/>
-              </a:solidFill>
-            </a:ln>
-          </p:spPr>
-          <p:style>
-            <a:lnRef idx="2">
-              <a:schemeClr val="accent2"/>
-            </a:lnRef>
-            <a:fillRef idx="0">
-              <a:schemeClr val="accent2"/>
-            </a:fillRef>
-            <a:effectRef idx="1">
-              <a:schemeClr val="accent2"/>
-            </a:effectRef>
-            <a:fontRef idx="minor">
-              <a:schemeClr val="tx1"/>
-            </a:fontRef>
-          </p:style>
-        </p:cxnSp>
-        <p:cxnSp>
-          <p:nvCxnSpPr>
-            <p:cNvPr id="86" name="Straight Connector 85"/>
-            <p:cNvCxnSpPr/>
-            <p:nvPr/>
-          </p:nvCxnSpPr>
-          <p:spPr>
-            <a:xfrm flipV="1">
-              <a:off x="8286750" y="3767667"/>
-              <a:ext cx="0" cy="2963333"/>
-            </a:xfrm>
-            <a:prstGeom prst="line">
-              <a:avLst/>
-            </a:prstGeom>
-            <a:ln>
-              <a:solidFill>
-                <a:srgbClr val="FF0000"/>
-              </a:solidFill>
-            </a:ln>
-          </p:spPr>
-          <p:style>
-            <a:lnRef idx="2">
-              <a:schemeClr val="accent2"/>
-            </a:lnRef>
-            <a:fillRef idx="0">
-              <a:schemeClr val="accent2"/>
-            </a:fillRef>
-            <a:effectRef idx="1">
-              <a:schemeClr val="accent2"/>
-            </a:effectRef>
-            <a:fontRef idx="minor">
-              <a:schemeClr val="tx1"/>
-            </a:fontRef>
-          </p:style>
-        </p:cxnSp>
-        <p:cxnSp>
-          <p:nvCxnSpPr>
-            <p:cNvPr id="104" name="Straight Arrow Connector 103"/>
-            <p:cNvCxnSpPr/>
-            <p:nvPr/>
-          </p:nvCxnSpPr>
-          <p:spPr>
-            <a:xfrm flipH="1">
-              <a:off x="7022584" y="3767667"/>
-              <a:ext cx="1264166" cy="0"/>
+              <a:off x="3416348" y="6271484"/>
+              <a:ext cx="0" cy="241811"/>
             </a:xfrm>
             <a:prstGeom prst="straightConnector1">
               <a:avLst/>
@@ -4499,13 +4469,101 @@
           </p:spPr>
           <p:style>
             <a:lnRef idx="2">
-              <a:schemeClr val="accent2"/>
+              <a:schemeClr val="accent1"/>
             </a:lnRef>
             <a:fillRef idx="0">
-              <a:schemeClr val="accent2"/>
+              <a:schemeClr val="accent1"/>
             </a:fillRef>
             <a:effectRef idx="1">
-              <a:schemeClr val="accent2"/>
+              <a:schemeClr val="accent1"/>
+            </a:effectRef>
+            <a:fontRef idx="minor">
+              <a:schemeClr val="tx1"/>
+            </a:fontRef>
+          </p:style>
+        </p:cxnSp>
+      </p:grpSp>
+      <p:grpSp>
+        <p:nvGrpSpPr>
+          <p:cNvPr id="192" name="Group 191"/>
+          <p:cNvGrpSpPr/>
+          <p:nvPr/>
+        </p:nvGrpSpPr>
+        <p:grpSpPr>
+          <a:xfrm>
+            <a:off x="3777732" y="2164955"/>
+            <a:ext cx="1317209" cy="1742163"/>
+            <a:chOff x="3777732" y="2164955"/>
+            <a:chExt cx="1317209" cy="1742163"/>
+          </a:xfrm>
+        </p:grpSpPr>
+        <p:cxnSp>
+          <p:nvCxnSpPr>
+            <p:cNvPr id="157" name="Straight Connector 156"/>
+            <p:cNvCxnSpPr/>
+            <p:nvPr/>
+          </p:nvCxnSpPr>
+          <p:spPr>
+            <a:xfrm flipH="1">
+              <a:off x="3777732" y="3907118"/>
+              <a:ext cx="1317209" cy="0"/>
+            </a:xfrm>
+            <a:prstGeom prst="line">
+              <a:avLst/>
+            </a:prstGeom>
+            <a:ln>
+              <a:solidFill>
+                <a:srgbClr val="008000"/>
+              </a:solidFill>
+            </a:ln>
+          </p:spPr>
+          <p:style>
+            <a:lnRef idx="2">
+              <a:schemeClr val="accent1"/>
+            </a:lnRef>
+            <a:fillRef idx="0">
+              <a:schemeClr val="accent1"/>
+            </a:fillRef>
+            <a:effectRef idx="1">
+              <a:schemeClr val="accent1"/>
+            </a:effectRef>
+            <a:fontRef idx="minor">
+              <a:schemeClr val="tx1"/>
+            </a:fontRef>
+          </p:style>
+        </p:cxnSp>
+        <p:cxnSp>
+          <p:nvCxnSpPr>
+            <p:cNvPr id="159" name="Straight Arrow Connector 158"/>
+            <p:cNvCxnSpPr>
+              <a:endCxn id="14" idx="2"/>
+            </p:cNvCxnSpPr>
+            <p:nvPr/>
+          </p:nvCxnSpPr>
+          <p:spPr>
+            <a:xfrm flipH="1" flipV="1">
+              <a:off x="3785203" y="2164955"/>
+              <a:ext cx="0" cy="1742163"/>
+            </a:xfrm>
+            <a:prstGeom prst="straightConnector1">
+              <a:avLst/>
+            </a:prstGeom>
+            <a:ln>
+              <a:solidFill>
+                <a:srgbClr val="008000"/>
+              </a:solidFill>
+              <a:tailEnd type="arrow"/>
+            </a:ln>
+          </p:spPr>
+          <p:style>
+            <a:lnRef idx="2">
+              <a:schemeClr val="accent1"/>
+            </a:lnRef>
+            <a:fillRef idx="0">
+              <a:schemeClr val="accent1"/>
+            </a:fillRef>
+            <a:effectRef idx="1">
+              <a:schemeClr val="accent1"/>
             </a:effectRef>
             <a:fontRef idx="minor">
               <a:schemeClr val="tx1"/>
@@ -4515,136 +4573,580 @@
       </p:grpSp>
       <p:cxnSp>
         <p:nvCxnSpPr>
-          <p:cNvPr id="110" name="Curved Connector 109"/>
-          <p:cNvCxnSpPr>
-            <a:endCxn id="5" idx="0"/>
-          </p:cNvCxnSpPr>
+          <p:cNvPr id="166" name="Straight Arrow Connector 165"/>
+          <p:cNvCxnSpPr/>
           <p:nvPr/>
         </p:nvCxnSpPr>
         <p:spPr>
-          <a:xfrm rot="10800000" flipV="1">
-            <a:off x="2510242" y="2516017"/>
-            <a:ext cx="3446059" cy="1829932"/>
+          <a:xfrm flipH="1">
+            <a:off x="6921147" y="1800412"/>
+            <a:ext cx="1176971" cy="0"/>
           </a:xfrm>
-          <a:prstGeom prst="curvedConnector2">
+          <a:prstGeom prst="straightConnector1">
             <a:avLst/>
           </a:prstGeom>
           <a:ln>
             <a:solidFill>
-              <a:srgbClr val="FF0000"/>
+              <a:srgbClr val="000090"/>
             </a:solidFill>
             <a:tailEnd type="arrow"/>
           </a:ln>
         </p:spPr>
         <p:style>
           <a:lnRef idx="2">
-            <a:schemeClr val="accent2"/>
+            <a:schemeClr val="accent1"/>
           </a:lnRef>
           <a:fillRef idx="0">
-            <a:schemeClr val="accent2"/>
+            <a:schemeClr val="accent1"/>
           </a:fillRef>
           <a:effectRef idx="1">
-            <a:schemeClr val="accent2"/>
+            <a:schemeClr val="accent1"/>
           </a:effectRef>
           <a:fontRef idx="minor">
             <a:schemeClr val="tx1"/>
           </a:fontRef>
         </p:style>
       </p:cxnSp>
-      <p:sp>
-        <p:nvSpPr>
-          <p:cNvPr id="111" name="Striped Right Arrow 110"/>
-          <p:cNvSpPr/>
+      <p:grpSp>
+        <p:nvGrpSpPr>
+          <p:cNvPr id="194" name="Group 193"/>
+          <p:cNvGrpSpPr/>
           <p:nvPr/>
-        </p:nvSpPr>
-        <p:spPr>
+        </p:nvGrpSpPr>
+        <p:grpSpPr>
           <a:xfrm>
-            <a:off x="110967" y="1027526"/>
-            <a:ext cx="508079" cy="484632"/>
+            <a:off x="443682" y="3907118"/>
+            <a:ext cx="8179408" cy="2800212"/>
+            <a:chOff x="443682" y="3907118"/>
+            <a:chExt cx="8179408" cy="2800212"/>
           </a:xfrm>
-          <a:prstGeom prst="stripedRightArrow">
-            <a:avLst>
-              <a:gd name="adj1" fmla="val 38944"/>
-              <a:gd name="adj2" fmla="val 42368"/>
-            </a:avLst>
-          </a:prstGeom>
-          <a:noFill/>
-          <a:ln w="19050" cmpd="sng">
-            <a:solidFill>
-              <a:srgbClr val="FF0000"/>
-            </a:solidFill>
-          </a:ln>
-        </p:spPr>
-        <p:style>
-          <a:lnRef idx="1">
-            <a:schemeClr val="accent1"/>
-          </a:lnRef>
-          <a:fillRef idx="3">
-            <a:schemeClr val="accent1"/>
-          </a:fillRef>
-          <a:effectRef idx="2">
-            <a:schemeClr val="accent1"/>
-          </a:effectRef>
-          <a:fontRef idx="minor">
-            <a:schemeClr val="lt1"/>
-          </a:fontRef>
-        </p:style>
-        <p:txBody>
-          <a:bodyPr rtlCol="0" anchor="ctr"/>
-          <a:lstStyle/>
-          <a:p>
-            <a:pPr algn="ctr"/>
-            <a:endParaRPr lang="en-US"/>
-          </a:p>
-        </p:txBody>
-      </p:sp>
-      <p:sp>
-        <p:nvSpPr>
-          <p:cNvPr id="112" name="Striped Right Arrow 111"/>
-          <p:cNvSpPr/>
+        </p:grpSpPr>
+        <p:cxnSp>
+          <p:nvCxnSpPr>
+            <p:cNvPr id="59" name="Straight Connector 58"/>
+            <p:cNvCxnSpPr/>
+            <p:nvPr/>
+          </p:nvCxnSpPr>
+          <p:spPr>
+            <a:xfrm>
+              <a:off x="443682" y="6707329"/>
+              <a:ext cx="8179408" cy="0"/>
+            </a:xfrm>
+            <a:prstGeom prst="line">
+              <a:avLst/>
+            </a:prstGeom>
+            <a:ln>
+              <a:solidFill>
+                <a:srgbClr val="000090"/>
+              </a:solidFill>
+            </a:ln>
+          </p:spPr>
+          <p:style>
+            <a:lnRef idx="2">
+              <a:schemeClr val="accent1"/>
+            </a:lnRef>
+            <a:fillRef idx="0">
+              <a:schemeClr val="accent1"/>
+            </a:fillRef>
+            <a:effectRef idx="1">
+              <a:schemeClr val="accent1"/>
+            </a:effectRef>
+            <a:fontRef idx="minor">
+              <a:schemeClr val="tx1"/>
+            </a:fontRef>
+          </p:style>
+        </p:cxnSp>
+        <p:cxnSp>
+          <p:nvCxnSpPr>
+            <p:cNvPr id="70" name="Straight Connector 69"/>
+            <p:cNvCxnSpPr/>
+            <p:nvPr/>
+          </p:nvCxnSpPr>
+          <p:spPr>
+            <a:xfrm flipV="1">
+              <a:off x="443682" y="4686150"/>
+              <a:ext cx="0" cy="2021179"/>
+            </a:xfrm>
+            <a:prstGeom prst="line">
+              <a:avLst/>
+            </a:prstGeom>
+            <a:ln>
+              <a:solidFill>
+                <a:srgbClr val="000090"/>
+              </a:solidFill>
+            </a:ln>
+          </p:spPr>
+          <p:style>
+            <a:lnRef idx="2">
+              <a:schemeClr val="accent1"/>
+            </a:lnRef>
+            <a:fillRef idx="0">
+              <a:schemeClr val="accent1"/>
+            </a:fillRef>
+            <a:effectRef idx="1">
+              <a:schemeClr val="accent1"/>
+            </a:effectRef>
+            <a:fontRef idx="minor">
+              <a:schemeClr val="tx1"/>
+            </a:fontRef>
+          </p:style>
+        </p:cxnSp>
+        <p:cxnSp>
+          <p:nvCxnSpPr>
+            <p:cNvPr id="94" name="Straight Connector 93"/>
+            <p:cNvCxnSpPr/>
+            <p:nvPr/>
+          </p:nvCxnSpPr>
+          <p:spPr>
+            <a:xfrm flipH="1">
+              <a:off x="443682" y="4686150"/>
+              <a:ext cx="765350" cy="0"/>
+            </a:xfrm>
+            <a:prstGeom prst="line">
+              <a:avLst/>
+            </a:prstGeom>
+            <a:ln>
+              <a:solidFill>
+                <a:srgbClr val="000090"/>
+              </a:solidFill>
+            </a:ln>
+          </p:spPr>
+          <p:style>
+            <a:lnRef idx="2">
+              <a:schemeClr val="accent1"/>
+            </a:lnRef>
+            <a:fillRef idx="0">
+              <a:schemeClr val="accent1"/>
+            </a:fillRef>
+            <a:effectRef idx="1">
+              <a:schemeClr val="accent1"/>
+            </a:effectRef>
+            <a:fontRef idx="minor">
+              <a:schemeClr val="tx1"/>
+            </a:fontRef>
+          </p:style>
+        </p:cxnSp>
+        <p:cxnSp>
+          <p:nvCxnSpPr>
+            <p:cNvPr id="80" name="Straight Connector 79"/>
+            <p:cNvCxnSpPr/>
+            <p:nvPr/>
+          </p:nvCxnSpPr>
+          <p:spPr>
+            <a:xfrm>
+              <a:off x="2751495" y="6234582"/>
+              <a:ext cx="0" cy="472747"/>
+            </a:xfrm>
+            <a:prstGeom prst="line">
+              <a:avLst/>
+            </a:prstGeom>
+            <a:ln>
+              <a:solidFill>
+                <a:srgbClr val="000090"/>
+              </a:solidFill>
+            </a:ln>
+          </p:spPr>
+          <p:style>
+            <a:lnRef idx="2">
+              <a:schemeClr val="accent1"/>
+            </a:lnRef>
+            <a:fillRef idx="0">
+              <a:schemeClr val="accent1"/>
+            </a:fillRef>
+            <a:effectRef idx="1">
+              <a:schemeClr val="accent1"/>
+            </a:effectRef>
+            <a:fontRef idx="minor">
+              <a:schemeClr val="tx1"/>
+            </a:fontRef>
+          </p:style>
+        </p:cxnSp>
+        <p:cxnSp>
+          <p:nvCxnSpPr>
+            <p:cNvPr id="99" name="Straight Connector 98"/>
+            <p:cNvCxnSpPr/>
+            <p:nvPr/>
+          </p:nvCxnSpPr>
+          <p:spPr>
+            <a:xfrm>
+              <a:off x="5768565" y="6234582"/>
+              <a:ext cx="0" cy="472748"/>
+            </a:xfrm>
+            <a:prstGeom prst="line">
+              <a:avLst/>
+            </a:prstGeom>
+            <a:ln>
+              <a:solidFill>
+                <a:srgbClr val="000090"/>
+              </a:solidFill>
+            </a:ln>
+          </p:spPr>
+          <p:style>
+            <a:lnRef idx="2">
+              <a:schemeClr val="accent1"/>
+            </a:lnRef>
+            <a:fillRef idx="0">
+              <a:schemeClr val="accent1"/>
+            </a:fillRef>
+            <a:effectRef idx="1">
+              <a:schemeClr val="accent1"/>
+            </a:effectRef>
+            <a:fontRef idx="minor">
+              <a:schemeClr val="tx1"/>
+            </a:fontRef>
+          </p:style>
+        </p:cxnSp>
+        <p:cxnSp>
+          <p:nvCxnSpPr>
+            <p:cNvPr id="91" name="Straight Connector 90"/>
+            <p:cNvCxnSpPr/>
+            <p:nvPr/>
+          </p:nvCxnSpPr>
+          <p:spPr>
+            <a:xfrm>
+              <a:off x="7281333" y="5672667"/>
+              <a:ext cx="0" cy="1034662"/>
+            </a:xfrm>
+            <a:prstGeom prst="line">
+              <a:avLst/>
+            </a:prstGeom>
+            <a:ln>
+              <a:solidFill>
+                <a:srgbClr val="000090"/>
+              </a:solidFill>
+            </a:ln>
+          </p:spPr>
+          <p:style>
+            <a:lnRef idx="2">
+              <a:schemeClr val="accent1"/>
+            </a:lnRef>
+            <a:fillRef idx="0">
+              <a:schemeClr val="accent1"/>
+            </a:fillRef>
+            <a:effectRef idx="1">
+              <a:schemeClr val="accent1"/>
+            </a:effectRef>
+            <a:fontRef idx="minor">
+              <a:schemeClr val="tx1"/>
+            </a:fontRef>
+          </p:style>
+        </p:cxnSp>
+        <p:cxnSp>
+          <p:nvCxnSpPr>
+            <p:cNvPr id="171" name="Straight Arrow Connector 170"/>
+            <p:cNvCxnSpPr/>
+            <p:nvPr/>
+          </p:nvCxnSpPr>
+          <p:spPr>
+            <a:xfrm flipH="1">
+              <a:off x="6921148" y="3907118"/>
+              <a:ext cx="1701942" cy="0"/>
+            </a:xfrm>
+            <a:prstGeom prst="straightConnector1">
+              <a:avLst/>
+            </a:prstGeom>
+            <a:ln>
+              <a:solidFill>
+                <a:srgbClr val="000090"/>
+              </a:solidFill>
+              <a:tailEnd type="arrow"/>
+            </a:ln>
+          </p:spPr>
+          <p:style>
+            <a:lnRef idx="2">
+              <a:schemeClr val="accent1"/>
+            </a:lnRef>
+            <a:fillRef idx="0">
+              <a:schemeClr val="accent1"/>
+            </a:fillRef>
+            <a:effectRef idx="1">
+              <a:schemeClr val="accent1"/>
+            </a:effectRef>
+            <a:fontRef idx="minor">
+              <a:schemeClr val="tx1"/>
+            </a:fontRef>
+          </p:style>
+        </p:cxnSp>
+        <p:cxnSp>
+          <p:nvCxnSpPr>
+            <p:cNvPr id="176" name="Straight Connector 175"/>
+            <p:cNvCxnSpPr/>
+            <p:nvPr/>
+          </p:nvCxnSpPr>
+          <p:spPr>
+            <a:xfrm>
+              <a:off x="8623090" y="3907118"/>
+              <a:ext cx="0" cy="2800211"/>
+            </a:xfrm>
+            <a:prstGeom prst="line">
+              <a:avLst/>
+            </a:prstGeom>
+            <a:ln>
+              <a:solidFill>
+                <a:srgbClr val="000090"/>
+              </a:solidFill>
+            </a:ln>
+          </p:spPr>
+          <p:style>
+            <a:lnRef idx="2">
+              <a:schemeClr val="accent1"/>
+            </a:lnRef>
+            <a:fillRef idx="0">
+              <a:schemeClr val="accent1"/>
+            </a:fillRef>
+            <a:effectRef idx="1">
+              <a:schemeClr val="accent1"/>
+            </a:effectRef>
+            <a:fontRef idx="minor">
+              <a:schemeClr val="tx1"/>
+            </a:fontRef>
+          </p:style>
+        </p:cxnSp>
+      </p:grpSp>
+      <p:grpSp>
+        <p:nvGrpSpPr>
+          <p:cNvPr id="193" name="Group 192"/>
+          <p:cNvGrpSpPr/>
           <p:nvPr/>
-        </p:nvSpPr>
-        <p:spPr>
+        </p:nvGrpSpPr>
+        <p:grpSpPr>
           <a:xfrm>
-            <a:off x="113530" y="3072883"/>
-            <a:ext cx="508079" cy="484632"/>
+            <a:off x="6212675" y="2172987"/>
+            <a:ext cx="1896612" cy="1734131"/>
+            <a:chOff x="6212675" y="2172987"/>
+            <a:chExt cx="1896612" cy="1734131"/>
           </a:xfrm>
-          <a:prstGeom prst="stripedRightArrow">
-            <a:avLst>
-              <a:gd name="adj1" fmla="val 38944"/>
-              <a:gd name="adj2" fmla="val 42368"/>
-            </a:avLst>
-          </a:prstGeom>
-          <a:noFill/>
-          <a:ln w="19050" cmpd="sng">
-            <a:solidFill>
-              <a:srgbClr val="FF0000"/>
-            </a:solidFill>
-          </a:ln>
-        </p:spPr>
-        <p:style>
-          <a:lnRef idx="1">
-            <a:schemeClr val="accent1"/>
-          </a:lnRef>
-          <a:fillRef idx="3">
-            <a:schemeClr val="accent1"/>
-          </a:fillRef>
-          <a:effectRef idx="2">
-            <a:schemeClr val="accent1"/>
-          </a:effectRef>
-          <a:fontRef idx="minor">
-            <a:schemeClr val="lt1"/>
-          </a:fontRef>
-        </p:style>
-        <p:txBody>
-          <a:bodyPr rtlCol="0" anchor="ctr"/>
-          <a:lstStyle/>
-          <a:p>
-            <a:pPr algn="ctr"/>
-            <a:endParaRPr lang="en-US"/>
-          </a:p>
-        </p:txBody>
-      </p:sp>
+        </p:grpSpPr>
+        <p:cxnSp>
+          <p:nvCxnSpPr>
+            <p:cNvPr id="168" name="Elbow Connector 167"/>
+            <p:cNvCxnSpPr>
+              <a:endCxn id="3" idx="2"/>
+            </p:cNvCxnSpPr>
+            <p:nvPr/>
+          </p:nvCxnSpPr>
+          <p:spPr>
+            <a:xfrm flipV="1">
+              <a:off x="6212675" y="2172987"/>
+              <a:ext cx="1896612" cy="1502542"/>
+            </a:xfrm>
+            <a:prstGeom prst="bentConnector2">
+              <a:avLst/>
+            </a:prstGeom>
+            <a:ln>
+              <a:solidFill>
+                <a:srgbClr val="660066"/>
+              </a:solidFill>
+              <a:tailEnd type="arrow"/>
+            </a:ln>
+          </p:spPr>
+          <p:style>
+            <a:lnRef idx="2">
+              <a:schemeClr val="accent1"/>
+            </a:lnRef>
+            <a:fillRef idx="0">
+              <a:schemeClr val="accent1"/>
+            </a:fillRef>
+            <a:effectRef idx="1">
+              <a:schemeClr val="accent1"/>
+            </a:effectRef>
+            <a:fontRef idx="minor">
+              <a:schemeClr val="tx1"/>
+            </a:fontRef>
+          </p:style>
+        </p:cxnSp>
+        <p:cxnSp>
+          <p:nvCxnSpPr>
+            <p:cNvPr id="180" name="Straight Connector 179"/>
+            <p:cNvCxnSpPr/>
+            <p:nvPr/>
+          </p:nvCxnSpPr>
+          <p:spPr>
+            <a:xfrm>
+              <a:off x="6212675" y="3675529"/>
+              <a:ext cx="0" cy="231589"/>
+            </a:xfrm>
+            <a:prstGeom prst="line">
+              <a:avLst/>
+            </a:prstGeom>
+            <a:ln>
+              <a:solidFill>
+                <a:srgbClr val="660066"/>
+              </a:solidFill>
+            </a:ln>
+          </p:spPr>
+          <p:style>
+            <a:lnRef idx="2">
+              <a:schemeClr val="accent1"/>
+            </a:lnRef>
+            <a:fillRef idx="0">
+              <a:schemeClr val="accent1"/>
+            </a:fillRef>
+            <a:effectRef idx="1">
+              <a:schemeClr val="accent1"/>
+            </a:effectRef>
+            <a:fontRef idx="minor">
+              <a:schemeClr val="tx1"/>
+            </a:fontRef>
+          </p:style>
+        </p:cxnSp>
+      </p:grpSp>
+      <p:grpSp>
+        <p:nvGrpSpPr>
+          <p:cNvPr id="199" name="Group 198"/>
+          <p:cNvGrpSpPr/>
+          <p:nvPr/>
+        </p:nvGrpSpPr>
+        <p:grpSpPr>
+          <a:xfrm>
+            <a:off x="1764695" y="1800412"/>
+            <a:ext cx="4003870" cy="2885738"/>
+            <a:chOff x="1764695" y="1800412"/>
+            <a:chExt cx="4003870" cy="2885738"/>
+          </a:xfrm>
+        </p:grpSpPr>
+        <p:cxnSp>
+          <p:nvCxnSpPr>
+            <p:cNvPr id="184" name="Straight Connector 183"/>
+            <p:cNvCxnSpPr/>
+            <p:nvPr/>
+          </p:nvCxnSpPr>
+          <p:spPr>
+            <a:xfrm>
+              <a:off x="5768565" y="1800412"/>
+              <a:ext cx="0" cy="1050549"/>
+            </a:xfrm>
+            <a:prstGeom prst="line">
+              <a:avLst/>
+            </a:prstGeom>
+            <a:ln>
+              <a:solidFill>
+                <a:srgbClr val="FF0000"/>
+              </a:solidFill>
+            </a:ln>
+          </p:spPr>
+          <p:style>
+            <a:lnRef idx="2">
+              <a:schemeClr val="accent1"/>
+            </a:lnRef>
+            <a:fillRef idx="0">
+              <a:schemeClr val="accent1"/>
+            </a:fillRef>
+            <a:effectRef idx="1">
+              <a:schemeClr val="accent1"/>
+            </a:effectRef>
+            <a:fontRef idx="minor">
+              <a:schemeClr val="tx1"/>
+            </a:fontRef>
+          </p:style>
+        </p:cxnSp>
+        <p:cxnSp>
+          <p:nvCxnSpPr>
+            <p:cNvPr id="186" name="Straight Connector 185"/>
+            <p:cNvCxnSpPr/>
+            <p:nvPr/>
+          </p:nvCxnSpPr>
+          <p:spPr>
+            <a:xfrm flipH="1">
+              <a:off x="2386259" y="2850961"/>
+              <a:ext cx="3382306" cy="0"/>
+            </a:xfrm>
+            <a:prstGeom prst="line">
+              <a:avLst/>
+            </a:prstGeom>
+            <a:ln>
+              <a:solidFill>
+                <a:srgbClr val="FF0000"/>
+              </a:solidFill>
+            </a:ln>
+          </p:spPr>
+          <p:style>
+            <a:lnRef idx="2">
+              <a:schemeClr val="accent1"/>
+            </a:lnRef>
+            <a:fillRef idx="0">
+              <a:schemeClr val="accent1"/>
+            </a:fillRef>
+            <a:effectRef idx="1">
+              <a:schemeClr val="accent1"/>
+            </a:effectRef>
+            <a:fontRef idx="minor">
+              <a:schemeClr val="tx1"/>
+            </a:fontRef>
+          </p:style>
+        </p:cxnSp>
+        <p:cxnSp>
+          <p:nvCxnSpPr>
+            <p:cNvPr id="188" name="Straight Connector 187"/>
+            <p:cNvCxnSpPr/>
+            <p:nvPr/>
+          </p:nvCxnSpPr>
+          <p:spPr>
+            <a:xfrm>
+              <a:off x="2386259" y="2850961"/>
+              <a:ext cx="0" cy="1835189"/>
+            </a:xfrm>
+            <a:prstGeom prst="line">
+              <a:avLst/>
+            </a:prstGeom>
+            <a:ln>
+              <a:solidFill>
+                <a:srgbClr val="FF0000"/>
+              </a:solidFill>
+            </a:ln>
+          </p:spPr>
+          <p:style>
+            <a:lnRef idx="2">
+              <a:schemeClr val="accent1"/>
+            </a:lnRef>
+            <a:fillRef idx="0">
+              <a:schemeClr val="accent1"/>
+            </a:fillRef>
+            <a:effectRef idx="1">
+              <a:schemeClr val="accent1"/>
+            </a:effectRef>
+            <a:fontRef idx="minor">
+              <a:schemeClr val="tx1"/>
+            </a:fontRef>
+          </p:style>
+        </p:cxnSp>
+        <p:cxnSp>
+          <p:nvCxnSpPr>
+            <p:cNvPr id="190" name="Straight Arrow Connector 189"/>
+            <p:cNvCxnSpPr/>
+            <p:nvPr/>
+          </p:nvCxnSpPr>
+          <p:spPr>
+            <a:xfrm flipH="1">
+              <a:off x="1764695" y="4686150"/>
+              <a:ext cx="621564" cy="0"/>
+            </a:xfrm>
+            <a:prstGeom prst="straightConnector1">
+              <a:avLst/>
+            </a:prstGeom>
+            <a:ln>
+              <a:solidFill>
+                <a:srgbClr val="FF0000"/>
+              </a:solidFill>
+              <a:tailEnd type="arrow"/>
+            </a:ln>
+          </p:spPr>
+          <p:style>
+            <a:lnRef idx="2">
+              <a:schemeClr val="accent1"/>
+            </a:lnRef>
+            <a:fillRef idx="0">
+              <a:schemeClr val="accent1"/>
+            </a:fillRef>
+            <a:effectRef idx="1">
+              <a:schemeClr val="accent1"/>
+            </a:effectRef>
+            <a:fontRef idx="minor">
+              <a:schemeClr val="tx1"/>
+            </a:fontRef>
+          </p:style>
+        </p:cxnSp>
+      </p:grpSp>
     </p:spTree>
     <p:extLst>
       <p:ext uri="{BB962C8B-B14F-4D97-AF65-F5344CB8AC3E}">

</xml_diff>

<commit_message>
Update finish view on storyboard
</commit_message>
<xml_diff>
--- a/Storyboard/storyboard.pptx
+++ b/Storyboard/storyboard.pptx
@@ -288,7 +288,7 @@
           <a:p>
             <a:fld id="{B0ABA59C-0228-654F-BFE1-95CDB89751EB}" type="datetimeFigureOut">
               <a:rPr lang="en-US" smtClean="0"/>
-              <a:t>2/26/16</a:t>
+              <a:t>2/29/16</a:t>
             </a:fld>
             <a:endParaRPr lang="en-US"/>
           </a:p>
@@ -458,7 +458,7 @@
           <a:p>
             <a:fld id="{B0ABA59C-0228-654F-BFE1-95CDB89751EB}" type="datetimeFigureOut">
               <a:rPr lang="en-US" smtClean="0"/>
-              <a:t>2/26/16</a:t>
+              <a:t>2/29/16</a:t>
             </a:fld>
             <a:endParaRPr lang="en-US"/>
           </a:p>
@@ -638,7 +638,7 @@
           <a:p>
             <a:fld id="{B0ABA59C-0228-654F-BFE1-95CDB89751EB}" type="datetimeFigureOut">
               <a:rPr lang="en-US" smtClean="0"/>
-              <a:t>2/26/16</a:t>
+              <a:t>2/29/16</a:t>
             </a:fld>
             <a:endParaRPr lang="en-US"/>
           </a:p>
@@ -808,7 +808,7 @@
           <a:p>
             <a:fld id="{B0ABA59C-0228-654F-BFE1-95CDB89751EB}" type="datetimeFigureOut">
               <a:rPr lang="en-US" smtClean="0"/>
-              <a:t>2/26/16</a:t>
+              <a:t>2/29/16</a:t>
             </a:fld>
             <a:endParaRPr lang="en-US"/>
           </a:p>
@@ -1054,7 +1054,7 @@
           <a:p>
             <a:fld id="{B0ABA59C-0228-654F-BFE1-95CDB89751EB}" type="datetimeFigureOut">
               <a:rPr lang="en-US" smtClean="0"/>
-              <a:t>2/26/16</a:t>
+              <a:t>2/29/16</a:t>
             </a:fld>
             <a:endParaRPr lang="en-US"/>
           </a:p>
@@ -1342,7 +1342,7 @@
           <a:p>
             <a:fld id="{B0ABA59C-0228-654F-BFE1-95CDB89751EB}" type="datetimeFigureOut">
               <a:rPr lang="en-US" smtClean="0"/>
-              <a:t>2/26/16</a:t>
+              <a:t>2/29/16</a:t>
             </a:fld>
             <a:endParaRPr lang="en-US"/>
           </a:p>
@@ -1764,7 +1764,7 @@
           <a:p>
             <a:fld id="{B0ABA59C-0228-654F-BFE1-95CDB89751EB}" type="datetimeFigureOut">
               <a:rPr lang="en-US" smtClean="0"/>
-              <a:t>2/26/16</a:t>
+              <a:t>2/29/16</a:t>
             </a:fld>
             <a:endParaRPr lang="en-US"/>
           </a:p>
@@ -1882,7 +1882,7 @@
           <a:p>
             <a:fld id="{B0ABA59C-0228-654F-BFE1-95CDB89751EB}" type="datetimeFigureOut">
               <a:rPr lang="en-US" smtClean="0"/>
-              <a:t>2/26/16</a:t>
+              <a:t>2/29/16</a:t>
             </a:fld>
             <a:endParaRPr lang="en-US"/>
           </a:p>
@@ -1977,7 +1977,7 @@
           <a:p>
             <a:fld id="{B0ABA59C-0228-654F-BFE1-95CDB89751EB}" type="datetimeFigureOut">
               <a:rPr lang="en-US" smtClean="0"/>
-              <a:t>2/26/16</a:t>
+              <a:t>2/29/16</a:t>
             </a:fld>
             <a:endParaRPr lang="en-US"/>
           </a:p>
@@ -2254,7 +2254,7 @@
           <a:p>
             <a:fld id="{B0ABA59C-0228-654F-BFE1-95CDB89751EB}" type="datetimeFigureOut">
               <a:rPr lang="en-US" smtClean="0"/>
-              <a:t>2/26/16</a:t>
+              <a:t>2/29/16</a:t>
             </a:fld>
             <a:endParaRPr lang="en-US"/>
           </a:p>
@@ -2507,7 +2507,7 @@
           <a:p>
             <a:fld id="{B0ABA59C-0228-654F-BFE1-95CDB89751EB}" type="datetimeFigureOut">
               <a:rPr lang="en-US" smtClean="0"/>
-              <a:t>2/26/16</a:t>
+              <a:t>2/29/16</a:t>
             </a:fld>
             <a:endParaRPr lang="en-US"/>
           </a:p>
@@ -2720,7 +2720,7 @@
           <a:p>
             <a:fld id="{B0ABA59C-0228-654F-BFE1-95CDB89751EB}" type="datetimeFigureOut">
               <a:rPr lang="en-US" smtClean="0"/>
-              <a:t>2/26/16</a:t>
+              <a:t>2/29/16</a:t>
             </a:fld>
             <a:endParaRPr lang="en-US"/>
           </a:p>
@@ -3108,6 +3108,43 @@
       </p:grpSpPr>
       <p:pic>
         <p:nvPicPr>
+          <p:cNvPr id="4" name="Picture 3" descr="Screen Shot 2016-02-29 at 10.01.59 AM.png"/>
+          <p:cNvPicPr>
+            <a:picLocks noChangeAspect="1"/>
+          </p:cNvPicPr>
+          <p:nvPr/>
+        </p:nvPicPr>
+        <p:blipFill>
+          <a:blip r:embed="rId2">
+            <a:extLst>
+              <a:ext uri="{28A0092B-C50C-407E-A947-70E740481C1C}">
+                <a14:useLocalDpi xmlns:a14="http://schemas.microsoft.com/office/drawing/2010/main" val="0"/>
+              </a:ext>
+            </a:extLst>
+          </a:blip>
+          <a:stretch>
+            <a:fillRect/>
+          </a:stretch>
+        </p:blipFill>
+        <p:spPr>
+          <a:xfrm>
+            <a:off x="6764739" y="4442684"/>
+            <a:ext cx="1091440" cy="1828800"/>
+          </a:xfrm>
+          <a:prstGeom prst="rect">
+            <a:avLst/>
+          </a:prstGeom>
+          <a:effectLst>
+            <a:outerShdw blurRad="50800" dist="38100" dir="2700000" algn="tl" rotWithShape="0">
+              <a:srgbClr val="000000">
+                <a:alpha val="43000"/>
+              </a:srgbClr>
+            </a:outerShdw>
+          </a:effectLst>
+        </p:spPr>
+      </p:pic>
+      <p:pic>
+        <p:nvPicPr>
           <p:cNvPr id="5" name="Picture 4" descr="IMG_6676.PNG"/>
           <p:cNvPicPr>
             <a:picLocks noChangeAspect="1"/>
@@ -3115,7 +3152,7 @@
           <p:nvPr/>
         </p:nvPicPr>
         <p:blipFill rotWithShape="1">
-          <a:blip r:embed="rId2">
+          <a:blip r:embed="rId3">
             <a:extLst>
               <a:ext uri="{28A0092B-C50C-407E-A947-70E740481C1C}">
                 <a14:useLocalDpi xmlns:a14="http://schemas.microsoft.com/office/drawing/2010/main" val="0"/>
@@ -3151,7 +3188,7 @@
           <p:nvPr/>
         </p:nvPicPr>
         <p:blipFill>
-          <a:blip r:embed="rId3">
+          <a:blip r:embed="rId4">
             <a:extLst>
               <a:ext uri="{28A0092B-C50C-407E-A947-70E740481C1C}">
                 <a14:useLocalDpi xmlns:a14="http://schemas.microsoft.com/office/drawing/2010/main" val="0"/>
@@ -3188,7 +3225,7 @@
           <p:nvPr/>
         </p:nvPicPr>
         <p:blipFill rotWithShape="1">
-          <a:blip r:embed="rId4">
+          <a:blip r:embed="rId5">
             <a:extLst>
               <a:ext uri="{28A0092B-C50C-407E-A947-70E740481C1C}">
                 <a14:useLocalDpi xmlns:a14="http://schemas.microsoft.com/office/drawing/2010/main" val="0"/>
@@ -3224,7 +3261,7 @@
           <p:nvPr/>
         </p:nvPicPr>
         <p:blipFill>
-          <a:blip r:embed="rId5">
+          <a:blip r:embed="rId6">
             <a:extLst>
               <a:ext uri="{28A0092B-C50C-407E-A947-70E740481C1C}">
                 <a14:useLocalDpi xmlns:a14="http://schemas.microsoft.com/office/drawing/2010/main" val="0"/>
@@ -3261,7 +3298,7 @@
           <p:nvPr/>
         </p:nvPicPr>
         <p:blipFill rotWithShape="1">
-          <a:blip r:embed="rId6">
+          <a:blip r:embed="rId7">
             <a:extLst>
               <a:ext uri="{28A0092B-C50C-407E-A947-70E740481C1C}">
                 <a14:useLocalDpi xmlns:a14="http://schemas.microsoft.com/office/drawing/2010/main" val="0"/>
@@ -3297,7 +3334,7 @@
           <p:nvPr/>
         </p:nvPicPr>
         <p:blipFill>
-          <a:blip r:embed="rId7">
+          <a:blip r:embed="rId8">
             <a:extLst>
               <a:ext uri="{28A0092B-C50C-407E-A947-70E740481C1C}">
                 <a14:useLocalDpi xmlns:a14="http://schemas.microsoft.com/office/drawing/2010/main" val="0"/>
@@ -3334,7 +3371,7 @@
           <p:nvPr/>
         </p:nvPicPr>
         <p:blipFill>
-          <a:blip r:embed="rId8">
+          <a:blip r:embed="rId9">
             <a:extLst>
               <a:ext uri="{28A0092B-C50C-407E-A947-70E740481C1C}">
                 <a14:useLocalDpi xmlns:a14="http://schemas.microsoft.com/office/drawing/2010/main" val="0"/>
@@ -3371,7 +3408,7 @@
           <p:nvPr/>
         </p:nvPicPr>
         <p:blipFill rotWithShape="1">
-          <a:blip r:embed="rId9">
+          <a:blip r:embed="rId10">
             <a:extLst>
               <a:ext uri="{28A0092B-C50C-407E-A947-70E740481C1C}">
                 <a14:useLocalDpi xmlns:a14="http://schemas.microsoft.com/office/drawing/2010/main" val="0"/>
@@ -3457,7 +3494,7 @@
             <p:nvPr/>
           </p:nvPicPr>
           <p:blipFill>
-            <a:blip r:embed="rId10"/>
+            <a:blip r:embed="rId11"/>
             <a:stretch>
               <a:fillRect/>
             </a:stretch>
@@ -3652,7 +3689,7 @@
           <p:nvPr/>
         </p:nvPicPr>
         <p:blipFill>
-          <a:blip r:embed="rId11">
+          <a:blip r:embed="rId12">
             <a:extLst>
               <a:ext uri="{28A0092B-C50C-407E-A947-70E740481C1C}">
                 <a14:useLocalDpi xmlns:a14="http://schemas.microsoft.com/office/drawing/2010/main" val="0"/>
@@ -4152,7 +4189,7 @@
             <p:nvPr/>
           </p:nvPicPr>
           <p:blipFill>
-            <a:blip r:embed="rId10"/>
+            <a:blip r:embed="rId11"/>
             <a:stretch>
               <a:fillRect/>
             </a:stretch>
@@ -4244,36 +4281,6 @@
           </p:style>
         </p:cxnSp>
       </p:grpSp>
-      <p:pic>
-        <p:nvPicPr>
-          <p:cNvPr id="87" name="Picture 86" descr="Screen Shot 2016-02-26 at 4.40.37 PM.png"/>
-          <p:cNvPicPr>
-            <a:picLocks noChangeAspect="1"/>
-          </p:cNvPicPr>
-          <p:nvPr/>
-        </p:nvPicPr>
-        <p:blipFill>
-          <a:blip r:embed="rId12">
-            <a:extLst>
-              <a:ext uri="{28A0092B-C50C-407E-A947-70E740481C1C}">
-                <a14:useLocalDpi xmlns:a14="http://schemas.microsoft.com/office/drawing/2010/main" val="0"/>
-              </a:ext>
-            </a:extLst>
-          </a:blip>
-          <a:stretch>
-            <a:fillRect/>
-          </a:stretch>
-        </p:blipFill>
-        <p:spPr>
-          <a:xfrm>
-            <a:off x="6764739" y="4442684"/>
-            <a:ext cx="1095814" cy="1828800"/>
-          </a:xfrm>
-          <a:prstGeom prst="rect">
-            <a:avLst/>
-          </a:prstGeom>
-        </p:spPr>
-      </p:pic>
       <p:grpSp>
         <p:nvGrpSpPr>
           <p:cNvPr id="198" name="Group 197"/>
@@ -4804,8 +4811,8 @@
           </p:nvCxnSpPr>
           <p:spPr>
             <a:xfrm>
-              <a:off x="7281333" y="5672667"/>
-              <a:ext cx="0" cy="1034662"/>
+              <a:off x="7281333" y="6139888"/>
+              <a:ext cx="0" cy="567441"/>
             </a:xfrm>
             <a:prstGeom prst="line">
               <a:avLst/>

</xml_diff>